<commit_message>
minor corrections to two PowerPoint slides
</commit_message>
<xml_diff>
--- a/PowerPoints/08 - Abstract Syntax Trees.pptx
+++ b/PowerPoints/08 - Abstract Syntax Trees.pptx
@@ -63,8 +63,8 @@
     <p:sldId id="348" r:id="rId51"/>
     <p:sldId id="358" r:id="rId52"/>
     <p:sldId id="365" r:id="rId53"/>
-    <p:sldId id="322" r:id="rId54"/>
-    <p:sldId id="360" r:id="rId55"/>
+    <p:sldId id="376" r:id="rId54"/>
+    <p:sldId id="377" r:id="rId55"/>
     <p:sldId id="336" r:id="rId56"/>
     <p:sldId id="337" r:id="rId57"/>
     <p:sldId id="338" r:id="rId58"/>
@@ -25507,10 +25507,81 @@
           </a:p>
         </p:txBody>
       </p:sp>
+      <p:sp>
+        <p:nvSpPr>
+          <p:cNvPr id="2" name="Footer Placeholder 1">
+            <a:extLst>
+              <a:ext uri="{FF2B5EF4-FFF2-40B4-BE49-F238E27FC236}">
+                <a16:creationId xmlns:a16="http://schemas.microsoft.com/office/drawing/2014/main" id="{14C24F91-5FF2-08C8-61E2-1742415EB552}"/>
+              </a:ext>
+            </a:extLst>
+          </p:cNvPr>
+          <p:cNvSpPr>
+            <a:spLocks noGrp="1"/>
+          </p:cNvSpPr>
+          <p:nvPr>
+            <p:ph type="ftr" sz="quarter" idx="10"/>
+          </p:nvPr>
+        </p:nvSpPr>
+        <p:spPr/>
+        <p:txBody>
+          <a:bodyPr/>
+          <a:lstStyle/>
+          <a:p>
+            <a:pPr>
+              <a:defRPr/>
+            </a:pPr>
+            <a:r>
+              <a:rPr lang="en-US"/>
+              <a:t>©SoftMoore Consulting</a:t>
+            </a:r>
+            <a:endParaRPr lang="en-US" dirty="0"/>
+          </a:p>
+        </p:txBody>
+      </p:sp>
+      <p:sp>
+        <p:nvSpPr>
+          <p:cNvPr id="6" name="Slide Number Placeholder 5">
+            <a:extLst>
+              <a:ext uri="{FF2B5EF4-FFF2-40B4-BE49-F238E27FC236}">
+                <a16:creationId xmlns:a16="http://schemas.microsoft.com/office/drawing/2014/main" id="{F8DF3534-279B-3BD7-5209-C9098DB888D3}"/>
+              </a:ext>
+            </a:extLst>
+          </p:cNvPr>
+          <p:cNvSpPr>
+            <a:spLocks noGrp="1"/>
+          </p:cNvSpPr>
+          <p:nvPr>
+            <p:ph type="sldNum" sz="quarter" idx="11"/>
+          </p:nvPr>
+        </p:nvSpPr>
+        <p:spPr/>
+        <p:txBody>
+          <a:bodyPr/>
+          <a:lstStyle/>
+          <a:p>
+            <a:pPr>
+              <a:defRPr/>
+            </a:pPr>
+            <a:r>
+              <a:rPr lang="en-US"/>
+              <a:t>Slide </a:t>
+            </a:r>
+            <a:fld id="{A413A2F6-7BFD-463C-B63A-922040FAF32C}" type="slidenum">
+              <a:rPr lang="en-US" smtClean="0"/>
+              <a:pPr>
+                <a:defRPr/>
+              </a:pPr>
+              <a:t>53</a:t>
+            </a:fld>
+            <a:endParaRPr lang="en-US" dirty="0"/>
+          </a:p>
+        </p:txBody>
+      </p:sp>
     </p:spTree>
     <p:extLst>
       <p:ext uri="{BB962C8B-B14F-4D97-AF65-F5344CB8AC3E}">
-        <p14:creationId xmlns:p14="http://schemas.microsoft.com/office/powerpoint/2010/main" val="1464259129"/>
+        <p14:creationId xmlns:p14="http://schemas.microsoft.com/office/powerpoint/2010/main" val="993968297"/>
       </p:ext>
     </p:extLst>
   </p:cSld>
@@ -25566,398 +25637,12 @@
           </a:p>
         </p:txBody>
       </p:sp>
-      <p:sp>
-        <p:nvSpPr>
-          <p:cNvPr id="33" name="TextBox 32">
+      <p:grpSp>
+        <p:nvGrpSpPr>
+          <p:cNvPr id="2" name="Group 1">
             <a:extLst>
               <a:ext uri="{FF2B5EF4-FFF2-40B4-BE49-F238E27FC236}">
-                <a16:creationId xmlns:a16="http://schemas.microsoft.com/office/drawing/2014/main" id="{B40B8BAE-B963-1D94-8EFD-E4E115CD6E73}"/>
-              </a:ext>
-            </a:extLst>
-          </p:cNvPr>
-          <p:cNvSpPr txBox="1"/>
-          <p:nvPr/>
-        </p:nvSpPr>
-        <p:spPr>
-          <a:xfrm>
-            <a:off x="3422368" y="1295400"/>
-            <a:ext cx="893642" cy="338554"/>
-          </a:xfrm>
-          <a:prstGeom prst="rect">
-            <a:avLst/>
-          </a:prstGeom>
-          <a:noFill/>
-          <a:ln>
-            <a:solidFill>
-              <a:schemeClr val="tx1"/>
-            </a:solidFill>
-          </a:ln>
-        </p:spPr>
-        <p:txBody>
-          <a:bodyPr wrap="none" rtlCol="0">
-            <a:spAutoFit/>
-          </a:bodyPr>
-          <a:lstStyle/>
-          <a:p>
-            <a:pPr algn="ctr"/>
-            <a:r>
-              <a:rPr lang="en-US" sz="1600" dirty="0"/>
-              <a:t>Program</a:t>
-            </a:r>
-          </a:p>
-        </p:txBody>
-      </p:sp>
-      <p:sp>
-        <p:nvSpPr>
-          <p:cNvPr id="34" name="TextBox 33">
-            <a:extLst>
-              <a:ext uri="{FF2B5EF4-FFF2-40B4-BE49-F238E27FC236}">
-                <a16:creationId xmlns:a16="http://schemas.microsoft.com/office/drawing/2014/main" id="{4E7B59A9-83EC-C8F8-48A9-96704FEDEDFE}"/>
-              </a:ext>
-            </a:extLst>
-          </p:cNvPr>
-          <p:cNvSpPr txBox="1"/>
-          <p:nvPr/>
-        </p:nvSpPr>
-        <p:spPr>
-          <a:xfrm>
-            <a:off x="5405834" y="2561556"/>
-            <a:ext cx="1441292" cy="584775"/>
-          </a:xfrm>
-          <a:prstGeom prst="rect">
-            <a:avLst/>
-          </a:prstGeom>
-          <a:noFill/>
-          <a:ln>
-            <a:solidFill>
-              <a:schemeClr val="tx1"/>
-            </a:solidFill>
-          </a:ln>
-        </p:spPr>
-        <p:txBody>
-          <a:bodyPr wrap="none" rtlCol="0">
-            <a:spAutoFit/>
-          </a:bodyPr>
-          <a:lstStyle>
-            <a:defPPr>
-              <a:defRPr lang="en-US"/>
-            </a:defPPr>
-          </a:lstStyle>
-          <a:p>
-            <a:pPr algn="ctr"/>
-            <a:r>
-              <a:rPr lang="en-US" sz="1600" dirty="0" err="1"/>
-              <a:t>ProcedureDecl</a:t>
-            </a:r>
-            <a:endParaRPr lang="en-US" sz="1600" dirty="0"/>
-          </a:p>
-          <a:p>
-            <a:pPr algn="ctr"/>
-            <a:r>
-              <a:rPr lang="en-US" sz="1600" dirty="0" err="1"/>
-              <a:t>procId</a:t>
-            </a:r>
-            <a:r>
-              <a:rPr lang="en-US" sz="1600" dirty="0"/>
-              <a:t> : "main"</a:t>
-            </a:r>
-          </a:p>
-        </p:txBody>
-      </p:sp>
-      <p:sp>
-        <p:nvSpPr>
-          <p:cNvPr id="35" name="TextBox 34">
-            <a:extLst>
-              <a:ext uri="{FF2B5EF4-FFF2-40B4-BE49-F238E27FC236}">
-                <a16:creationId xmlns:a16="http://schemas.microsoft.com/office/drawing/2014/main" id="{699314D6-F52C-FB2A-52C0-A36769AFC65A}"/>
-              </a:ext>
-            </a:extLst>
-          </p:cNvPr>
-          <p:cNvSpPr txBox="1"/>
-          <p:nvPr/>
-        </p:nvSpPr>
-        <p:spPr>
-          <a:xfrm>
-            <a:off x="493296" y="3602420"/>
-            <a:ext cx="2194560" cy="1077218"/>
-          </a:xfrm>
-          <a:prstGeom prst="rect">
-            <a:avLst/>
-          </a:prstGeom>
-          <a:noFill/>
-          <a:ln>
-            <a:solidFill>
-              <a:schemeClr val="tx1"/>
-            </a:solidFill>
-          </a:ln>
-        </p:spPr>
-        <p:txBody>
-          <a:bodyPr wrap="none" rtlCol="0">
-            <a:spAutoFit/>
-          </a:bodyPr>
-          <a:lstStyle>
-            <a:defPPr>
-              <a:defRPr lang="en-US"/>
-            </a:defPPr>
-          </a:lstStyle>
-          <a:p>
-            <a:pPr algn="l"/>
-            <a:r>
-              <a:rPr lang="en-US" sz="1600" dirty="0"/>
-              <a:t>       SingleVarDecl</a:t>
-            </a:r>
-          </a:p>
-          <a:p>
-            <a:pPr algn="l"/>
-            <a:r>
-              <a:rPr lang="en-US" sz="1600" dirty="0"/>
-              <a:t>identifier : “x”</a:t>
-            </a:r>
-          </a:p>
-          <a:p>
-            <a:pPr algn="l"/>
-            <a:r>
-              <a:rPr lang="en-US" sz="1600" dirty="0" err="1"/>
-              <a:t>varType</a:t>
-            </a:r>
-            <a:r>
-              <a:rPr lang="en-US" sz="1600" dirty="0"/>
-              <a:t> : Integer</a:t>
-            </a:r>
-          </a:p>
-          <a:p>
-            <a:pPr algn="l"/>
-            <a:r>
-              <a:rPr lang="en-US" sz="1600" dirty="0" err="1"/>
-              <a:t>scopeLevel</a:t>
-            </a:r>
-            <a:r>
-              <a:rPr lang="en-US" sz="1600" dirty="0"/>
-              <a:t> : </a:t>
-            </a:r>
-            <a:r>
-              <a:rPr lang="en-US" sz="1600" dirty="0">
-                <a:latin typeface="Consolas" panose="020B0609020204030204" pitchFamily="49" charset="0"/>
-              </a:rPr>
-              <a:t>PROGRAM</a:t>
-            </a:r>
-          </a:p>
-        </p:txBody>
-      </p:sp>
-      <p:sp>
-        <p:nvSpPr>
-          <p:cNvPr id="37" name="TextBox 36">
-            <a:extLst>
-              <a:ext uri="{FF2B5EF4-FFF2-40B4-BE49-F238E27FC236}">
-                <a16:creationId xmlns:a16="http://schemas.microsoft.com/office/drawing/2014/main" id="{2CB889D7-DD78-F88D-F99F-A54CBCCDDB03}"/>
-              </a:ext>
-            </a:extLst>
-          </p:cNvPr>
-          <p:cNvSpPr txBox="1"/>
-          <p:nvPr/>
-        </p:nvSpPr>
-        <p:spPr>
-          <a:xfrm>
-            <a:off x="5212277" y="5486400"/>
-            <a:ext cx="1280160" cy="584775"/>
-          </a:xfrm>
-          <a:prstGeom prst="rect">
-            <a:avLst/>
-          </a:prstGeom>
-          <a:noFill/>
-          <a:ln>
-            <a:solidFill>
-              <a:schemeClr val="tx1"/>
-            </a:solidFill>
-          </a:ln>
-        </p:spPr>
-        <p:txBody>
-          <a:bodyPr wrap="none" rtlCol="0">
-            <a:spAutoFit/>
-          </a:bodyPr>
-          <a:lstStyle>
-            <a:defPPr>
-              <a:defRPr lang="en-US"/>
-            </a:defPPr>
-          </a:lstStyle>
-          <a:p>
-            <a:pPr algn="l"/>
-            <a:r>
-              <a:rPr lang="en-US" sz="1600" dirty="0"/>
-              <a:t> ConstValue</a:t>
-            </a:r>
-          </a:p>
-          <a:p>
-            <a:pPr algn="l"/>
-            <a:r>
-              <a:rPr lang="en-US" sz="1600" dirty="0"/>
-              <a:t>literal : 5</a:t>
-            </a:r>
-          </a:p>
-        </p:txBody>
-      </p:sp>
-      <p:cxnSp>
-        <p:nvCxnSpPr>
-          <p:cNvPr id="38" name="Elbow Connector 2">
-            <a:extLst>
-              <a:ext uri="{FF2B5EF4-FFF2-40B4-BE49-F238E27FC236}">
-                <a16:creationId xmlns:a16="http://schemas.microsoft.com/office/drawing/2014/main" id="{980BCE1F-9F6D-45C1-D066-2A671070B640}"/>
-              </a:ext>
-            </a:extLst>
-          </p:cNvPr>
-          <p:cNvCxnSpPr>
-            <a:cxnSpLocks/>
-            <a:stCxn id="33" idx="2"/>
-            <a:endCxn id="56" idx="0"/>
-          </p:cNvCxnSpPr>
-          <p:nvPr/>
-        </p:nvCxnSpPr>
-        <p:spPr bwMode="auto">
-          <a:xfrm rot="5400000">
-            <a:off x="2556260" y="668271"/>
-            <a:ext cx="347246" cy="2278613"/>
-          </a:xfrm>
-          <a:prstGeom prst="bentConnector3">
-            <a:avLst>
-              <a:gd name="adj1" fmla="val 50000"/>
-            </a:avLst>
-          </a:prstGeom>
-          <a:noFill/>
-          <a:ln w="9525" cap="flat" cmpd="sng" algn="ctr">
-            <a:solidFill>
-              <a:schemeClr val="tx1"/>
-            </a:solidFill>
-            <a:prstDash val="solid"/>
-            <a:round/>
-            <a:headEnd type="none" w="med" len="med"/>
-            <a:tailEnd type="triangle"/>
-          </a:ln>
-          <a:effectLst/>
-        </p:spPr>
-      </p:cxnSp>
-      <p:cxnSp>
-        <p:nvCxnSpPr>
-          <p:cNvPr id="40" name="Elbow Connector 14">
-            <a:extLst>
-              <a:ext uri="{FF2B5EF4-FFF2-40B4-BE49-F238E27FC236}">
-                <a16:creationId xmlns:a16="http://schemas.microsoft.com/office/drawing/2014/main" id="{E7717DE4-FA2A-9077-A6EC-702567F85664}"/>
-              </a:ext>
-            </a:extLst>
-          </p:cNvPr>
-          <p:cNvCxnSpPr>
-            <a:cxnSpLocks/>
-            <a:stCxn id="33" idx="2"/>
-            <a:endCxn id="60" idx="0"/>
-          </p:cNvCxnSpPr>
-          <p:nvPr/>
-        </p:nvCxnSpPr>
-        <p:spPr bwMode="auto">
-          <a:xfrm rot="16200000" flipH="1">
-            <a:off x="4824211" y="678931"/>
-            <a:ext cx="347246" cy="2257291"/>
-          </a:xfrm>
-          <a:prstGeom prst="bentConnector3">
-            <a:avLst>
-              <a:gd name="adj1" fmla="val 50000"/>
-            </a:avLst>
-          </a:prstGeom>
-          <a:noFill/>
-          <a:ln w="9525" cap="flat" cmpd="sng" algn="ctr">
-            <a:solidFill>
-              <a:schemeClr val="tx1"/>
-            </a:solidFill>
-            <a:prstDash val="solid"/>
-            <a:round/>
-            <a:headEnd type="none" w="med" len="med"/>
-            <a:tailEnd type="triangle"/>
-          </a:ln>
-          <a:effectLst/>
-        </p:spPr>
-      </p:cxnSp>
-      <p:cxnSp>
-        <p:nvCxnSpPr>
-          <p:cNvPr id="42" name="Elbow Connector 18">
-            <a:extLst>
-              <a:ext uri="{FF2B5EF4-FFF2-40B4-BE49-F238E27FC236}">
-                <a16:creationId xmlns:a16="http://schemas.microsoft.com/office/drawing/2014/main" id="{E4FB3901-8B32-00C1-8CEA-51E14A211077}"/>
-              </a:ext>
-            </a:extLst>
-          </p:cNvPr>
-          <p:cNvCxnSpPr>
-            <a:cxnSpLocks/>
-            <a:stCxn id="57" idx="2"/>
-            <a:endCxn id="70" idx="0"/>
-          </p:cNvCxnSpPr>
-          <p:nvPr/>
-        </p:nvCxnSpPr>
-        <p:spPr bwMode="auto">
-          <a:xfrm rot="5400000">
-            <a:off x="5225583" y="3137702"/>
-            <a:ext cx="311914" cy="1489882"/>
-          </a:xfrm>
-          <a:prstGeom prst="bentConnector3">
-            <a:avLst>
-              <a:gd name="adj1" fmla="val 50000"/>
-            </a:avLst>
-          </a:prstGeom>
-          <a:noFill/>
-          <a:ln w="9525" cap="flat" cmpd="sng" algn="ctr">
-            <a:solidFill>
-              <a:schemeClr val="tx1"/>
-            </a:solidFill>
-            <a:prstDash val="solid"/>
-            <a:round/>
-            <a:headEnd type="none" w="med" len="med"/>
-            <a:tailEnd type="triangle"/>
-          </a:ln>
-          <a:effectLst/>
-        </p:spPr>
-      </p:cxnSp>
-      <p:cxnSp>
-        <p:nvCxnSpPr>
-          <p:cNvPr id="43" name="Elbow Connector 20">
-            <a:extLst>
-              <a:ext uri="{FF2B5EF4-FFF2-40B4-BE49-F238E27FC236}">
-                <a16:creationId xmlns:a16="http://schemas.microsoft.com/office/drawing/2014/main" id="{190EFB64-A54B-AE00-B6F6-AAB8CB61D20B}"/>
-              </a:ext>
-            </a:extLst>
-          </p:cNvPr>
-          <p:cNvCxnSpPr>
-            <a:cxnSpLocks/>
-            <a:stCxn id="57" idx="2"/>
-            <a:endCxn id="68" idx="0"/>
-          </p:cNvCxnSpPr>
-          <p:nvPr/>
-        </p:nvCxnSpPr>
-        <p:spPr bwMode="auto">
-          <a:xfrm rot="16200000" flipH="1">
-            <a:off x="6577897" y="3275269"/>
-            <a:ext cx="311914" cy="1214747"/>
-          </a:xfrm>
-          <a:prstGeom prst="bentConnector3">
-            <a:avLst>
-              <a:gd name="adj1" fmla="val 50000"/>
-            </a:avLst>
-          </a:prstGeom>
-          <a:noFill/>
-          <a:ln w="9525" cap="flat" cmpd="sng" algn="ctr">
-            <a:solidFill>
-              <a:schemeClr val="tx1"/>
-            </a:solidFill>
-            <a:prstDash val="solid"/>
-            <a:round/>
-            <a:headEnd type="none" w="med" len="med"/>
-            <a:tailEnd type="triangle"/>
-          </a:ln>
-          <a:effectLst/>
-        </p:spPr>
-      </p:cxnSp>
-      <p:grpSp>
-        <p:nvGrpSpPr>
-          <p:cNvPr id="44" name="Group 43">
-            <a:extLst>
-              <a:ext uri="{FF2B5EF4-FFF2-40B4-BE49-F238E27FC236}">
-                <a16:creationId xmlns:a16="http://schemas.microsoft.com/office/drawing/2014/main" id="{07DB9C3C-74EE-C18A-F8A9-6B99F5817AB0}"/>
+                <a16:creationId xmlns:a16="http://schemas.microsoft.com/office/drawing/2014/main" id="{F5C3C41E-D663-E19F-C562-EC082B2ACFB1}"/>
               </a:ext>
             </a:extLst>
           </p:cNvPr>
@@ -25966,18 +25651,18 @@
         </p:nvGrpSpPr>
         <p:grpSpPr>
           <a:xfrm>
-            <a:off x="3767919" y="4038600"/>
-            <a:ext cx="1737360" cy="1077218"/>
-            <a:chOff x="3830724" y="3200400"/>
-            <a:chExt cx="1594667" cy="1077218"/>
+            <a:off x="530592" y="1295400"/>
+            <a:ext cx="8082816" cy="5021997"/>
+            <a:chOff x="533400" y="1295400"/>
+            <a:chExt cx="8082816" cy="5021997"/>
           </a:xfrm>
         </p:grpSpPr>
         <p:sp>
           <p:nvSpPr>
-            <p:cNvPr id="70" name="TextBox 69">
+            <p:cNvPr id="33" name="TextBox 32">
               <a:extLst>
                 <a:ext uri="{FF2B5EF4-FFF2-40B4-BE49-F238E27FC236}">
-                  <a16:creationId xmlns:a16="http://schemas.microsoft.com/office/drawing/2014/main" id="{BD3A8EE5-777F-97DE-B372-9715BABD6FAB}"/>
+                  <a16:creationId xmlns:a16="http://schemas.microsoft.com/office/drawing/2014/main" id="{B40B8BAE-B963-1D94-8EFD-E4E115CD6E73}"/>
                 </a:ext>
               </a:extLst>
             </p:cNvPr>
@@ -25986,8 +25671,106 @@
           </p:nvSpPr>
           <p:spPr>
             <a:xfrm>
-              <a:off x="3830724" y="3200400"/>
-              <a:ext cx="1594667" cy="1077218"/>
+              <a:off x="3422368" y="1295400"/>
+              <a:ext cx="893642" cy="338554"/>
+            </a:xfrm>
+            <a:prstGeom prst="rect">
+              <a:avLst/>
+            </a:prstGeom>
+            <a:noFill/>
+            <a:ln>
+              <a:solidFill>
+                <a:schemeClr val="tx1"/>
+              </a:solidFill>
+            </a:ln>
+          </p:spPr>
+          <p:txBody>
+            <a:bodyPr wrap="none" rtlCol="0">
+              <a:spAutoFit/>
+            </a:bodyPr>
+            <a:lstStyle/>
+            <a:p>
+              <a:pPr algn="ctr"/>
+              <a:r>
+                <a:rPr lang="en-US" sz="1600" dirty="0"/>
+                <a:t>Program</a:t>
+              </a:r>
+            </a:p>
+          </p:txBody>
+        </p:sp>
+        <p:sp>
+          <p:nvSpPr>
+            <p:cNvPr id="34" name="TextBox 33">
+              <a:extLst>
+                <a:ext uri="{FF2B5EF4-FFF2-40B4-BE49-F238E27FC236}">
+                  <a16:creationId xmlns:a16="http://schemas.microsoft.com/office/drawing/2014/main" id="{4E7B59A9-83EC-C8F8-48A9-96704FEDEDFE}"/>
+                </a:ext>
+              </a:extLst>
+            </p:cNvPr>
+            <p:cNvSpPr txBox="1"/>
+            <p:nvPr/>
+          </p:nvSpPr>
+          <p:spPr>
+            <a:xfrm>
+              <a:off x="5405834" y="2561556"/>
+              <a:ext cx="1441292" cy="584775"/>
+            </a:xfrm>
+            <a:prstGeom prst="rect">
+              <a:avLst/>
+            </a:prstGeom>
+            <a:noFill/>
+            <a:ln>
+              <a:solidFill>
+                <a:schemeClr val="tx1"/>
+              </a:solidFill>
+            </a:ln>
+          </p:spPr>
+          <p:txBody>
+            <a:bodyPr wrap="none" rtlCol="0">
+              <a:spAutoFit/>
+            </a:bodyPr>
+            <a:lstStyle>
+              <a:defPPr>
+                <a:defRPr lang="en-US"/>
+              </a:defPPr>
+            </a:lstStyle>
+            <a:p>
+              <a:pPr algn="ctr"/>
+              <a:r>
+                <a:rPr lang="en-US" sz="1600" dirty="0" err="1"/>
+                <a:t>ProcedureDecl</a:t>
+              </a:r>
+              <a:endParaRPr lang="en-US" sz="1600" dirty="0"/>
+            </a:p>
+            <a:p>
+              <a:pPr algn="ctr"/>
+              <a:r>
+                <a:rPr lang="en-US" sz="1600" dirty="0" err="1"/>
+                <a:t>procId</a:t>
+              </a:r>
+              <a:r>
+                <a:rPr lang="en-US" sz="1600" dirty="0"/>
+                <a:t> : "main"</a:t>
+              </a:r>
+            </a:p>
+          </p:txBody>
+        </p:sp>
+        <p:sp>
+          <p:nvSpPr>
+            <p:cNvPr id="35" name="TextBox 34">
+              <a:extLst>
+                <a:ext uri="{FF2B5EF4-FFF2-40B4-BE49-F238E27FC236}">
+                  <a16:creationId xmlns:a16="http://schemas.microsoft.com/office/drawing/2014/main" id="{699314D6-F52C-FB2A-52C0-A36769AFC65A}"/>
+                </a:ext>
+              </a:extLst>
+            </p:cNvPr>
+            <p:cNvSpPr txBox="1"/>
+            <p:nvPr/>
+          </p:nvSpPr>
+          <p:spPr>
+            <a:xfrm>
+              <a:off x="533400" y="3602420"/>
+              <a:ext cx="2066591" cy="1077218"/>
             </a:xfrm>
             <a:prstGeom prst="rect">
               <a:avLst/>
@@ -26012,201 +25795,48 @@
               <a:pPr algn="l"/>
               <a:r>
                 <a:rPr lang="en-US" sz="1600" dirty="0"/>
-                <a:t> AssignmentStmt</a:t>
+                <a:t>       SingleVarDecl</a:t>
               </a:r>
             </a:p>
             <a:p>
               <a:pPr algn="l"/>
               <a:r>
                 <a:rPr lang="en-US" sz="1600" dirty="0"/>
-                <a:t>      variable  </a:t>
+                <a:t>identifier : “x”</a:t>
+              </a:r>
+            </a:p>
+            <a:p>
+              <a:pPr algn="l"/>
+              <a:r>
+                <a:rPr lang="en-US" sz="1600" dirty="0" err="1"/>
+                <a:t>varType</a:t>
+              </a:r>
+              <a:r>
+                <a:rPr lang="en-US" sz="1600" dirty="0"/>
+                <a:t> : Integer</a:t>
               </a:r>
             </a:p>
             <a:p>
               <a:pPr algn="l"/>
               <a:r>
                 <a:rPr lang="en-US" sz="1600" dirty="0"/>
-                <a:t>expression  </a:t>
+                <a:t>scopeLevel : </a:t>
               </a:r>
-            </a:p>
-            <a:p>
-              <a:pPr algn="l"/>
               <a:r>
-                <a:rPr lang="en-US" sz="1600" dirty="0"/>
-                <a:t>position : (3, 6)</a:t>
+                <a:rPr lang="en-US" sz="1600" dirty="0">
+                  <a:latin typeface="Consolas" panose="020B0609020204030204" pitchFamily="49" charset="0"/>
+                </a:rPr>
+                <a:t>GLOBAL</a:t>
               </a:r>
             </a:p>
           </p:txBody>
         </p:sp>
         <p:sp>
           <p:nvSpPr>
-            <p:cNvPr id="71" name="Oval 70">
+            <p:cNvPr id="37" name="TextBox 36">
               <a:extLst>
                 <a:ext uri="{FF2B5EF4-FFF2-40B4-BE49-F238E27FC236}">
-                  <a16:creationId xmlns:a16="http://schemas.microsoft.com/office/drawing/2014/main" id="{0C846E69-4E78-09ED-CF87-AA1BB6CB9B01}"/>
-                </a:ext>
-              </a:extLst>
-            </p:cNvPr>
-            <p:cNvSpPr/>
-            <p:nvPr/>
-          </p:nvSpPr>
-          <p:spPr bwMode="auto">
-            <a:xfrm>
-              <a:off x="4019083" y="3581339"/>
-              <a:ext cx="85989" cy="85989"/>
-            </a:xfrm>
-            <a:prstGeom prst="ellipse">
-              <a:avLst/>
-            </a:prstGeom>
-            <a:solidFill>
-              <a:schemeClr val="tx1"/>
-            </a:solidFill>
-            <a:ln w="9525" cap="flat" cmpd="sng" algn="ctr">
-              <a:solidFill>
-                <a:schemeClr val="tx1"/>
-              </a:solidFill>
-              <a:prstDash val="solid"/>
-              <a:round/>
-              <a:headEnd type="none" w="med" len="med"/>
-              <a:tailEnd type="none" w="med" len="med"/>
-            </a:ln>
-            <a:effectLst/>
-          </p:spPr>
-          <p:txBody>
-            <a:bodyPr vert="horz" wrap="none" lIns="92075" tIns="46038" rIns="92075" bIns="46038" numCol="1" rtlCol="0" anchor="ctr" anchorCtr="0" compatLnSpc="1">
-              <a:prstTxWarp prst="textNoShape">
-                <a:avLst/>
-              </a:prstTxWarp>
-            </a:bodyPr>
-            <a:lstStyle/>
-            <a:p>
-              <a:pPr marL="0" marR="0" indent="0" algn="l" defTabSz="914400" rtl="0" eaLnBrk="0" fontAlgn="base" latinLnBrk="0" hangingPunct="0">
-                <a:lnSpc>
-                  <a:spcPct val="100000"/>
-                </a:lnSpc>
-                <a:spcBef>
-                  <a:spcPct val="0"/>
-                </a:spcBef>
-                <a:spcAft>
-                  <a:spcPct val="0"/>
-                </a:spcAft>
-                <a:buClrTx/>
-                <a:buSzTx/>
-                <a:buFontTx/>
-                <a:buNone/>
-                <a:tabLst/>
-              </a:pPr>
-              <a:endParaRPr kumimoji="0" lang="en-US" sz="2400" b="0" i="0" u="none" strike="noStrike" cap="none" normalizeH="0" baseline="0">
-                <a:ln>
-                  <a:noFill/>
-                </a:ln>
-                <a:solidFill>
-                  <a:schemeClr val="tx1"/>
-                </a:solidFill>
-                <a:effectLst/>
-                <a:latin typeface="Arial" charset="0"/>
-              </a:endParaRPr>
-            </a:p>
-          </p:txBody>
-        </p:sp>
-        <p:sp>
-          <p:nvSpPr>
-            <p:cNvPr id="72" name="Oval 71">
-              <a:extLst>
-                <a:ext uri="{FF2B5EF4-FFF2-40B4-BE49-F238E27FC236}">
-                  <a16:creationId xmlns:a16="http://schemas.microsoft.com/office/drawing/2014/main" id="{4D49059E-C640-838A-5442-9D3A583FB987}"/>
-                </a:ext>
-              </a:extLst>
-            </p:cNvPr>
-            <p:cNvSpPr/>
-            <p:nvPr/>
-          </p:nvSpPr>
-          <p:spPr bwMode="auto">
-            <a:xfrm>
-              <a:off x="5048656" y="3819728"/>
-              <a:ext cx="85989" cy="85989"/>
-            </a:xfrm>
-            <a:prstGeom prst="ellipse">
-              <a:avLst/>
-            </a:prstGeom>
-            <a:solidFill>
-              <a:schemeClr val="tx1"/>
-            </a:solidFill>
-            <a:ln w="9525" cap="flat" cmpd="sng" algn="ctr">
-              <a:solidFill>
-                <a:schemeClr val="tx1"/>
-              </a:solidFill>
-              <a:prstDash val="solid"/>
-              <a:round/>
-              <a:headEnd type="none" w="med" len="med"/>
-              <a:tailEnd type="none" w="med" len="med"/>
-            </a:ln>
-            <a:effectLst/>
-          </p:spPr>
-          <p:txBody>
-            <a:bodyPr vert="horz" wrap="none" lIns="92075" tIns="46038" rIns="92075" bIns="46038" numCol="1" rtlCol="0" anchor="ctr" anchorCtr="0" compatLnSpc="1">
-              <a:prstTxWarp prst="textNoShape">
-                <a:avLst/>
-              </a:prstTxWarp>
-            </a:bodyPr>
-            <a:lstStyle/>
-            <a:p>
-              <a:pPr marL="0" marR="0" indent="0" algn="l" defTabSz="914400" rtl="0" eaLnBrk="0" fontAlgn="base" latinLnBrk="0" hangingPunct="0">
-                <a:lnSpc>
-                  <a:spcPct val="100000"/>
-                </a:lnSpc>
-                <a:spcBef>
-                  <a:spcPct val="0"/>
-                </a:spcBef>
-                <a:spcAft>
-                  <a:spcPct val="0"/>
-                </a:spcAft>
-                <a:buClrTx/>
-                <a:buSzTx/>
-                <a:buFontTx/>
-                <a:buNone/>
-                <a:tabLst/>
-              </a:pPr>
-              <a:endParaRPr kumimoji="0" lang="en-US" sz="2400" b="0" i="0" u="none" strike="noStrike" cap="none" normalizeH="0" baseline="0">
-                <a:ln>
-                  <a:noFill/>
-                </a:ln>
-                <a:solidFill>
-                  <a:schemeClr val="tx1"/>
-                </a:solidFill>
-                <a:effectLst/>
-                <a:latin typeface="Arial" charset="0"/>
-              </a:endParaRPr>
-            </a:p>
-          </p:txBody>
-        </p:sp>
-      </p:grpSp>
-      <p:grpSp>
-        <p:nvGrpSpPr>
-          <p:cNvPr id="45" name="Group 44">
-            <a:extLst>
-              <a:ext uri="{FF2B5EF4-FFF2-40B4-BE49-F238E27FC236}">
-                <a16:creationId xmlns:a16="http://schemas.microsoft.com/office/drawing/2014/main" id="{0A2E124F-EA64-188D-3923-907A9A13C51C}"/>
-              </a:ext>
-            </a:extLst>
-          </p:cNvPr>
-          <p:cNvGrpSpPr/>
-          <p:nvPr/>
-        </p:nvGrpSpPr>
-        <p:grpSpPr>
-          <a:xfrm>
-            <a:off x="6609297" y="4038600"/>
-            <a:ext cx="1463862" cy="584775"/>
-            <a:chOff x="6672101" y="3200400"/>
-            <a:chExt cx="1463862" cy="584775"/>
-          </a:xfrm>
-        </p:grpSpPr>
-        <p:sp>
-          <p:nvSpPr>
-            <p:cNvPr id="68" name="TextBox 67">
-              <a:extLst>
-                <a:ext uri="{FF2B5EF4-FFF2-40B4-BE49-F238E27FC236}">
-                  <a16:creationId xmlns:a16="http://schemas.microsoft.com/office/drawing/2014/main" id="{B61BC937-C329-1B9A-2C67-5C0CF473CB2C}"/>
+                  <a16:creationId xmlns:a16="http://schemas.microsoft.com/office/drawing/2014/main" id="{2CB889D7-DD78-F88D-F99F-A54CBCCDDB03}"/>
                 </a:ext>
               </a:extLst>
             </p:cNvPr>
@@ -26215,8 +25845,8 @@
           </p:nvSpPr>
           <p:spPr>
             <a:xfrm>
-              <a:off x="6672101" y="3200400"/>
-              <a:ext cx="1463862" cy="584775"/>
+              <a:off x="5212277" y="5486400"/>
+              <a:ext cx="1280160" cy="584775"/>
             </a:xfrm>
             <a:prstGeom prst="rect">
               <a:avLst/>
@@ -26241,46 +25871,45 @@
               <a:pPr algn="l"/>
               <a:r>
                 <a:rPr lang="en-US" sz="1600" dirty="0"/>
-                <a:t>  </a:t>
+                <a:t> ConstValue</a:t>
               </a:r>
-              <a:r>
-                <a:rPr lang="en-US" sz="1600" dirty="0" err="1"/>
-                <a:t>OutputStmt</a:t>
-              </a:r>
-              <a:endParaRPr lang="en-US" sz="1600" dirty="0"/>
             </a:p>
             <a:p>
               <a:pPr algn="l"/>
               <a:r>
                 <a:rPr lang="en-US" sz="1600" dirty="0"/>
-                <a:t>expression     </a:t>
+                <a:t>literal : 5</a:t>
               </a:r>
             </a:p>
           </p:txBody>
         </p:sp>
-        <p:sp>
-          <p:nvSpPr>
-            <p:cNvPr id="69" name="Oval 68">
+        <p:cxnSp>
+          <p:nvCxnSpPr>
+            <p:cNvPr id="38" name="Elbow Connector 2">
               <a:extLst>
                 <a:ext uri="{FF2B5EF4-FFF2-40B4-BE49-F238E27FC236}">
-                  <a16:creationId xmlns:a16="http://schemas.microsoft.com/office/drawing/2014/main" id="{F9FF2055-26B4-F4DC-8476-3B524F583BBB}"/>
+                  <a16:creationId xmlns:a16="http://schemas.microsoft.com/office/drawing/2014/main" id="{980BCE1F-9F6D-45C1-D066-2A671070B640}"/>
                 </a:ext>
               </a:extLst>
             </p:cNvPr>
-            <p:cNvSpPr/>
+            <p:cNvCxnSpPr>
+              <a:cxnSpLocks/>
+              <a:stCxn id="33" idx="2"/>
+              <a:endCxn id="56" idx="0"/>
+            </p:cNvCxnSpPr>
             <p:nvPr/>
-          </p:nvSpPr>
+          </p:nvCxnSpPr>
           <p:spPr bwMode="auto">
-            <a:xfrm>
-              <a:off x="7814811" y="3591067"/>
-              <a:ext cx="85989" cy="85989"/>
+            <a:xfrm rot="5400000">
+              <a:off x="2544319" y="656330"/>
+              <a:ext cx="347246" cy="2302494"/>
             </a:xfrm>
-            <a:prstGeom prst="ellipse">
-              <a:avLst/>
+            <a:prstGeom prst="bentConnector3">
+              <a:avLst>
+                <a:gd name="adj1" fmla="val 50000"/>
+              </a:avLst>
             </a:prstGeom>
-            <a:solidFill>
-              <a:schemeClr val="tx1"/>
-            </a:solidFill>
+            <a:noFill/>
             <a:ln w="9525" cap="flat" cmpd="sng" algn="ctr">
               <a:solidFill>
                 <a:schemeClr val="tx1"/>
@@ -26288,74 +25917,1005 @@
               <a:prstDash val="solid"/>
               <a:round/>
               <a:headEnd type="none" w="med" len="med"/>
-              <a:tailEnd type="none" w="med" len="med"/>
+              <a:tailEnd type="triangle"/>
             </a:ln>
             <a:effectLst/>
           </p:spPr>
-          <p:txBody>
-            <a:bodyPr vert="horz" wrap="none" lIns="92075" tIns="46038" rIns="92075" bIns="46038" numCol="1" rtlCol="0" anchor="ctr" anchorCtr="0" compatLnSpc="1">
-              <a:prstTxWarp prst="textNoShape">
+        </p:cxnSp>
+        <p:cxnSp>
+          <p:nvCxnSpPr>
+            <p:cNvPr id="40" name="Elbow Connector 14">
+              <a:extLst>
+                <a:ext uri="{FF2B5EF4-FFF2-40B4-BE49-F238E27FC236}">
+                  <a16:creationId xmlns:a16="http://schemas.microsoft.com/office/drawing/2014/main" id="{E7717DE4-FA2A-9077-A6EC-702567F85664}"/>
+                </a:ext>
+              </a:extLst>
+            </p:cNvPr>
+            <p:cNvCxnSpPr>
+              <a:cxnSpLocks/>
+              <a:stCxn id="33" idx="2"/>
+              <a:endCxn id="60" idx="0"/>
+            </p:cNvCxnSpPr>
+            <p:nvPr/>
+          </p:nvCxnSpPr>
+          <p:spPr bwMode="auto">
+            <a:xfrm rot="16200000" flipH="1">
+              <a:off x="4824211" y="678931"/>
+              <a:ext cx="347246" cy="2257291"/>
+            </a:xfrm>
+            <a:prstGeom prst="bentConnector3">
+              <a:avLst>
+                <a:gd name="adj1" fmla="val 50000"/>
+              </a:avLst>
+            </a:prstGeom>
+            <a:noFill/>
+            <a:ln w="9525" cap="flat" cmpd="sng" algn="ctr">
+              <a:solidFill>
+                <a:schemeClr val="tx1"/>
+              </a:solidFill>
+              <a:prstDash val="solid"/>
+              <a:round/>
+              <a:headEnd type="none" w="med" len="med"/>
+              <a:tailEnd type="triangle"/>
+            </a:ln>
+            <a:effectLst/>
+          </p:spPr>
+        </p:cxnSp>
+        <p:cxnSp>
+          <p:nvCxnSpPr>
+            <p:cNvPr id="42" name="Elbow Connector 18">
+              <a:extLst>
+                <a:ext uri="{FF2B5EF4-FFF2-40B4-BE49-F238E27FC236}">
+                  <a16:creationId xmlns:a16="http://schemas.microsoft.com/office/drawing/2014/main" id="{E4FB3901-8B32-00C1-8CEA-51E14A211077}"/>
+                </a:ext>
+              </a:extLst>
+            </p:cNvPr>
+            <p:cNvCxnSpPr>
+              <a:cxnSpLocks/>
+              <a:stCxn id="57" idx="2"/>
+              <a:endCxn id="70" idx="0"/>
+            </p:cNvCxnSpPr>
+            <p:nvPr/>
+          </p:nvCxnSpPr>
+          <p:spPr bwMode="auto">
+            <a:xfrm rot="5400000">
+              <a:off x="5225583" y="3137702"/>
+              <a:ext cx="311914" cy="1489882"/>
+            </a:xfrm>
+            <a:prstGeom prst="bentConnector3">
+              <a:avLst>
+                <a:gd name="adj1" fmla="val 50000"/>
+              </a:avLst>
+            </a:prstGeom>
+            <a:noFill/>
+            <a:ln w="9525" cap="flat" cmpd="sng" algn="ctr">
+              <a:solidFill>
+                <a:schemeClr val="tx1"/>
+              </a:solidFill>
+              <a:prstDash val="solid"/>
+              <a:round/>
+              <a:headEnd type="none" w="med" len="med"/>
+              <a:tailEnd type="triangle"/>
+            </a:ln>
+            <a:effectLst/>
+          </p:spPr>
+        </p:cxnSp>
+        <p:cxnSp>
+          <p:nvCxnSpPr>
+            <p:cNvPr id="43" name="Elbow Connector 20">
+              <a:extLst>
+                <a:ext uri="{FF2B5EF4-FFF2-40B4-BE49-F238E27FC236}">
+                  <a16:creationId xmlns:a16="http://schemas.microsoft.com/office/drawing/2014/main" id="{190EFB64-A54B-AE00-B6F6-AAB8CB61D20B}"/>
+                </a:ext>
+              </a:extLst>
+            </p:cNvPr>
+            <p:cNvCxnSpPr>
+              <a:cxnSpLocks/>
+              <a:stCxn id="57" idx="2"/>
+              <a:endCxn id="68" idx="0"/>
+            </p:cNvCxnSpPr>
+            <p:nvPr/>
+          </p:nvCxnSpPr>
+          <p:spPr bwMode="auto">
+            <a:xfrm rot="16200000" flipH="1">
+              <a:off x="6577897" y="3275269"/>
+              <a:ext cx="311914" cy="1214747"/>
+            </a:xfrm>
+            <a:prstGeom prst="bentConnector3">
+              <a:avLst>
+                <a:gd name="adj1" fmla="val 50000"/>
+              </a:avLst>
+            </a:prstGeom>
+            <a:noFill/>
+            <a:ln w="9525" cap="flat" cmpd="sng" algn="ctr">
+              <a:solidFill>
+                <a:schemeClr val="tx1"/>
+              </a:solidFill>
+              <a:prstDash val="solid"/>
+              <a:round/>
+              <a:headEnd type="none" w="med" len="med"/>
+              <a:tailEnd type="triangle"/>
+            </a:ln>
+            <a:effectLst/>
+          </p:spPr>
+        </p:cxnSp>
+        <p:grpSp>
+          <p:nvGrpSpPr>
+            <p:cNvPr id="44" name="Group 43">
+              <a:extLst>
+                <a:ext uri="{FF2B5EF4-FFF2-40B4-BE49-F238E27FC236}">
+                  <a16:creationId xmlns:a16="http://schemas.microsoft.com/office/drawing/2014/main" id="{07DB9C3C-74EE-C18A-F8A9-6B99F5817AB0}"/>
+                </a:ext>
+              </a:extLst>
+            </p:cNvPr>
+            <p:cNvGrpSpPr/>
+            <p:nvPr/>
+          </p:nvGrpSpPr>
+          <p:grpSpPr>
+            <a:xfrm>
+              <a:off x="3767919" y="4038600"/>
+              <a:ext cx="1737360" cy="1077218"/>
+              <a:chOff x="3830724" y="3200400"/>
+              <a:chExt cx="1594667" cy="1077218"/>
+            </a:xfrm>
+          </p:grpSpPr>
+          <p:sp>
+            <p:nvSpPr>
+              <p:cNvPr id="70" name="TextBox 69">
+                <a:extLst>
+                  <a:ext uri="{FF2B5EF4-FFF2-40B4-BE49-F238E27FC236}">
+                    <a16:creationId xmlns:a16="http://schemas.microsoft.com/office/drawing/2014/main" id="{BD3A8EE5-777F-97DE-B372-9715BABD6FAB}"/>
+                  </a:ext>
+                </a:extLst>
+              </p:cNvPr>
+              <p:cNvSpPr txBox="1"/>
+              <p:nvPr/>
+            </p:nvSpPr>
+            <p:spPr>
+              <a:xfrm>
+                <a:off x="3830724" y="3200400"/>
+                <a:ext cx="1594667" cy="1077218"/>
+              </a:xfrm>
+              <a:prstGeom prst="rect">
                 <a:avLst/>
-              </a:prstTxWarp>
-            </a:bodyPr>
-            <a:lstStyle/>
-            <a:p>
-              <a:pPr marL="0" marR="0" indent="0" algn="l" defTabSz="914400" rtl="0" eaLnBrk="0" fontAlgn="base" latinLnBrk="0" hangingPunct="0">
-                <a:lnSpc>
-                  <a:spcPct val="100000"/>
-                </a:lnSpc>
-                <a:spcBef>
-                  <a:spcPct val="0"/>
-                </a:spcBef>
-                <a:spcAft>
-                  <a:spcPct val="0"/>
-                </a:spcAft>
-                <a:buClrTx/>
-                <a:buSzTx/>
-                <a:buFontTx/>
-                <a:buNone/>
-                <a:tabLst/>
-              </a:pPr>
-              <a:endParaRPr kumimoji="0" lang="en-US" sz="2400" b="0" i="0" u="none" strike="noStrike" cap="none" normalizeH="0" baseline="0">
-                <a:ln>
-                  <a:noFill/>
-                </a:ln>
+              </a:prstGeom>
+              <a:noFill/>
+              <a:ln>
                 <a:solidFill>
                   <a:schemeClr val="tx1"/>
                 </a:solidFill>
-                <a:effectLst/>
-                <a:latin typeface="Arial" charset="0"/>
-              </a:endParaRPr>
-            </a:p>
-          </p:txBody>
-        </p:sp>
-      </p:grpSp>
-      <p:grpSp>
-        <p:nvGrpSpPr>
-          <p:cNvPr id="46" name="Group 45">
-            <a:extLst>
-              <a:ext uri="{FF2B5EF4-FFF2-40B4-BE49-F238E27FC236}">
-                <a16:creationId xmlns:a16="http://schemas.microsoft.com/office/drawing/2014/main" id="{1437F269-4451-3664-5E63-70820750BAC0}"/>
-              </a:ext>
-            </a:extLst>
-          </p:cNvPr>
-          <p:cNvGrpSpPr/>
-          <p:nvPr/>
-        </p:nvGrpSpPr>
-        <p:grpSpPr>
-          <a:xfrm>
-            <a:off x="6970296" y="5486400"/>
-            <a:ext cx="1645920" cy="830997"/>
-            <a:chOff x="7120434" y="4911022"/>
-            <a:chExt cx="1645920" cy="830997"/>
-          </a:xfrm>
-        </p:grpSpPr>
+              </a:ln>
+            </p:spPr>
+            <p:txBody>
+              <a:bodyPr wrap="none" rtlCol="0">
+                <a:spAutoFit/>
+              </a:bodyPr>
+              <a:lstStyle>
+                <a:defPPr>
+                  <a:defRPr lang="en-US"/>
+                </a:defPPr>
+              </a:lstStyle>
+              <a:p>
+                <a:pPr algn="l"/>
+                <a:r>
+                  <a:rPr lang="en-US" sz="1600" dirty="0"/>
+                  <a:t> AssignmentStmt</a:t>
+                </a:r>
+              </a:p>
+              <a:p>
+                <a:pPr algn="l"/>
+                <a:r>
+                  <a:rPr lang="en-US" sz="1600" dirty="0"/>
+                  <a:t>      variable  </a:t>
+                </a:r>
+              </a:p>
+              <a:p>
+                <a:pPr algn="l"/>
+                <a:r>
+                  <a:rPr lang="en-US" sz="1600" dirty="0"/>
+                  <a:t>expression  </a:t>
+                </a:r>
+              </a:p>
+              <a:p>
+                <a:pPr algn="l"/>
+                <a:r>
+                  <a:rPr lang="en-US" sz="1600" dirty="0"/>
+                  <a:t>position : (3, 6)</a:t>
+                </a:r>
+              </a:p>
+            </p:txBody>
+          </p:sp>
+          <p:sp>
+            <p:nvSpPr>
+              <p:cNvPr id="71" name="Oval 70">
+                <a:extLst>
+                  <a:ext uri="{FF2B5EF4-FFF2-40B4-BE49-F238E27FC236}">
+                    <a16:creationId xmlns:a16="http://schemas.microsoft.com/office/drawing/2014/main" id="{0C846E69-4E78-09ED-CF87-AA1BB6CB9B01}"/>
+                  </a:ext>
+                </a:extLst>
+              </p:cNvPr>
+              <p:cNvSpPr/>
+              <p:nvPr/>
+            </p:nvSpPr>
+            <p:spPr bwMode="auto">
+              <a:xfrm>
+                <a:off x="4019083" y="3581339"/>
+                <a:ext cx="85989" cy="85989"/>
+              </a:xfrm>
+              <a:prstGeom prst="ellipse">
+                <a:avLst/>
+              </a:prstGeom>
+              <a:solidFill>
+                <a:schemeClr val="tx1"/>
+              </a:solidFill>
+              <a:ln w="9525" cap="flat" cmpd="sng" algn="ctr">
+                <a:solidFill>
+                  <a:schemeClr val="tx1"/>
+                </a:solidFill>
+                <a:prstDash val="solid"/>
+                <a:round/>
+                <a:headEnd type="none" w="med" len="med"/>
+                <a:tailEnd type="none" w="med" len="med"/>
+              </a:ln>
+              <a:effectLst/>
+            </p:spPr>
+            <p:txBody>
+              <a:bodyPr vert="horz" wrap="none" lIns="92075" tIns="46038" rIns="92075" bIns="46038" numCol="1" rtlCol="0" anchor="ctr" anchorCtr="0" compatLnSpc="1">
+                <a:prstTxWarp prst="textNoShape">
+                  <a:avLst/>
+                </a:prstTxWarp>
+              </a:bodyPr>
+              <a:lstStyle/>
+              <a:p>
+                <a:pPr marL="0" marR="0" indent="0" algn="l" defTabSz="914400" rtl="0" eaLnBrk="0" fontAlgn="base" latinLnBrk="0" hangingPunct="0">
+                  <a:lnSpc>
+                    <a:spcPct val="100000"/>
+                  </a:lnSpc>
+                  <a:spcBef>
+                    <a:spcPct val="0"/>
+                  </a:spcBef>
+                  <a:spcAft>
+                    <a:spcPct val="0"/>
+                  </a:spcAft>
+                  <a:buClrTx/>
+                  <a:buSzTx/>
+                  <a:buFontTx/>
+                  <a:buNone/>
+                  <a:tabLst/>
+                </a:pPr>
+                <a:endParaRPr kumimoji="0" lang="en-US" sz="2400" b="0" i="0" u="none" strike="noStrike" cap="none" normalizeH="0" baseline="0">
+                  <a:ln>
+                    <a:noFill/>
+                  </a:ln>
+                  <a:solidFill>
+                    <a:schemeClr val="tx1"/>
+                  </a:solidFill>
+                  <a:effectLst/>
+                  <a:latin typeface="Arial" charset="0"/>
+                </a:endParaRPr>
+              </a:p>
+            </p:txBody>
+          </p:sp>
+          <p:sp>
+            <p:nvSpPr>
+              <p:cNvPr id="72" name="Oval 71">
+                <a:extLst>
+                  <a:ext uri="{FF2B5EF4-FFF2-40B4-BE49-F238E27FC236}">
+                    <a16:creationId xmlns:a16="http://schemas.microsoft.com/office/drawing/2014/main" id="{4D49059E-C640-838A-5442-9D3A583FB987}"/>
+                  </a:ext>
+                </a:extLst>
+              </p:cNvPr>
+              <p:cNvSpPr/>
+              <p:nvPr/>
+            </p:nvSpPr>
+            <p:spPr bwMode="auto">
+              <a:xfrm>
+                <a:off x="5048656" y="3819728"/>
+                <a:ext cx="85989" cy="85989"/>
+              </a:xfrm>
+              <a:prstGeom prst="ellipse">
+                <a:avLst/>
+              </a:prstGeom>
+              <a:solidFill>
+                <a:schemeClr val="tx1"/>
+              </a:solidFill>
+              <a:ln w="9525" cap="flat" cmpd="sng" algn="ctr">
+                <a:solidFill>
+                  <a:schemeClr val="tx1"/>
+                </a:solidFill>
+                <a:prstDash val="solid"/>
+                <a:round/>
+                <a:headEnd type="none" w="med" len="med"/>
+                <a:tailEnd type="none" w="med" len="med"/>
+              </a:ln>
+              <a:effectLst/>
+            </p:spPr>
+            <p:txBody>
+              <a:bodyPr vert="horz" wrap="none" lIns="92075" tIns="46038" rIns="92075" bIns="46038" numCol="1" rtlCol="0" anchor="ctr" anchorCtr="0" compatLnSpc="1">
+                <a:prstTxWarp prst="textNoShape">
+                  <a:avLst/>
+                </a:prstTxWarp>
+              </a:bodyPr>
+              <a:lstStyle/>
+              <a:p>
+                <a:pPr marL="0" marR="0" indent="0" algn="l" defTabSz="914400" rtl="0" eaLnBrk="0" fontAlgn="base" latinLnBrk="0" hangingPunct="0">
+                  <a:lnSpc>
+                    <a:spcPct val="100000"/>
+                  </a:lnSpc>
+                  <a:spcBef>
+                    <a:spcPct val="0"/>
+                  </a:spcBef>
+                  <a:spcAft>
+                    <a:spcPct val="0"/>
+                  </a:spcAft>
+                  <a:buClrTx/>
+                  <a:buSzTx/>
+                  <a:buFontTx/>
+                  <a:buNone/>
+                  <a:tabLst/>
+                </a:pPr>
+                <a:endParaRPr kumimoji="0" lang="en-US" sz="2400" b="0" i="0" u="none" strike="noStrike" cap="none" normalizeH="0" baseline="0">
+                  <a:ln>
+                    <a:noFill/>
+                  </a:ln>
+                  <a:solidFill>
+                    <a:schemeClr val="tx1"/>
+                  </a:solidFill>
+                  <a:effectLst/>
+                  <a:latin typeface="Arial" charset="0"/>
+                </a:endParaRPr>
+              </a:p>
+            </p:txBody>
+          </p:sp>
+        </p:grpSp>
+        <p:grpSp>
+          <p:nvGrpSpPr>
+            <p:cNvPr id="45" name="Group 44">
+              <a:extLst>
+                <a:ext uri="{FF2B5EF4-FFF2-40B4-BE49-F238E27FC236}">
+                  <a16:creationId xmlns:a16="http://schemas.microsoft.com/office/drawing/2014/main" id="{0A2E124F-EA64-188D-3923-907A9A13C51C}"/>
+                </a:ext>
+              </a:extLst>
+            </p:cNvPr>
+            <p:cNvGrpSpPr/>
+            <p:nvPr/>
+          </p:nvGrpSpPr>
+          <p:grpSpPr>
+            <a:xfrm>
+              <a:off x="6609297" y="4038600"/>
+              <a:ext cx="1463862" cy="584775"/>
+              <a:chOff x="6672101" y="3200400"/>
+              <a:chExt cx="1463862" cy="584775"/>
+            </a:xfrm>
+          </p:grpSpPr>
+          <p:sp>
+            <p:nvSpPr>
+              <p:cNvPr id="68" name="TextBox 67">
+                <a:extLst>
+                  <a:ext uri="{FF2B5EF4-FFF2-40B4-BE49-F238E27FC236}">
+                    <a16:creationId xmlns:a16="http://schemas.microsoft.com/office/drawing/2014/main" id="{B61BC937-C329-1B9A-2C67-5C0CF473CB2C}"/>
+                  </a:ext>
+                </a:extLst>
+              </p:cNvPr>
+              <p:cNvSpPr txBox="1"/>
+              <p:nvPr/>
+            </p:nvSpPr>
+            <p:spPr>
+              <a:xfrm>
+                <a:off x="6672101" y="3200400"/>
+                <a:ext cx="1463862" cy="584775"/>
+              </a:xfrm>
+              <a:prstGeom prst="rect">
+                <a:avLst/>
+              </a:prstGeom>
+              <a:noFill/>
+              <a:ln>
+                <a:solidFill>
+                  <a:schemeClr val="tx1"/>
+                </a:solidFill>
+              </a:ln>
+            </p:spPr>
+            <p:txBody>
+              <a:bodyPr wrap="none" rtlCol="0">
+                <a:spAutoFit/>
+              </a:bodyPr>
+              <a:lstStyle>
+                <a:defPPr>
+                  <a:defRPr lang="en-US"/>
+                </a:defPPr>
+              </a:lstStyle>
+              <a:p>
+                <a:pPr algn="l"/>
+                <a:r>
+                  <a:rPr lang="en-US" sz="1600" dirty="0"/>
+                  <a:t>  </a:t>
+                </a:r>
+                <a:r>
+                  <a:rPr lang="en-US" sz="1600" dirty="0" err="1"/>
+                  <a:t>OutputStmt</a:t>
+                </a:r>
+                <a:endParaRPr lang="en-US" sz="1600" dirty="0"/>
+              </a:p>
+              <a:p>
+                <a:pPr algn="l"/>
+                <a:r>
+                  <a:rPr lang="en-US" sz="1600" dirty="0"/>
+                  <a:t>expression     </a:t>
+                </a:r>
+              </a:p>
+            </p:txBody>
+          </p:sp>
+          <p:sp>
+            <p:nvSpPr>
+              <p:cNvPr id="69" name="Oval 68">
+                <a:extLst>
+                  <a:ext uri="{FF2B5EF4-FFF2-40B4-BE49-F238E27FC236}">
+                    <a16:creationId xmlns:a16="http://schemas.microsoft.com/office/drawing/2014/main" id="{F9FF2055-26B4-F4DC-8476-3B524F583BBB}"/>
+                  </a:ext>
+                </a:extLst>
+              </p:cNvPr>
+              <p:cNvSpPr/>
+              <p:nvPr/>
+            </p:nvSpPr>
+            <p:spPr bwMode="auto">
+              <a:xfrm>
+                <a:off x="7814811" y="3591067"/>
+                <a:ext cx="85989" cy="85989"/>
+              </a:xfrm>
+              <a:prstGeom prst="ellipse">
+                <a:avLst/>
+              </a:prstGeom>
+              <a:solidFill>
+                <a:schemeClr val="tx1"/>
+              </a:solidFill>
+              <a:ln w="9525" cap="flat" cmpd="sng" algn="ctr">
+                <a:solidFill>
+                  <a:schemeClr val="tx1"/>
+                </a:solidFill>
+                <a:prstDash val="solid"/>
+                <a:round/>
+                <a:headEnd type="none" w="med" len="med"/>
+                <a:tailEnd type="none" w="med" len="med"/>
+              </a:ln>
+              <a:effectLst/>
+            </p:spPr>
+            <p:txBody>
+              <a:bodyPr vert="horz" wrap="none" lIns="92075" tIns="46038" rIns="92075" bIns="46038" numCol="1" rtlCol="0" anchor="ctr" anchorCtr="0" compatLnSpc="1">
+                <a:prstTxWarp prst="textNoShape">
+                  <a:avLst/>
+                </a:prstTxWarp>
+              </a:bodyPr>
+              <a:lstStyle/>
+              <a:p>
+                <a:pPr marL="0" marR="0" indent="0" algn="l" defTabSz="914400" rtl="0" eaLnBrk="0" fontAlgn="base" latinLnBrk="0" hangingPunct="0">
+                  <a:lnSpc>
+                    <a:spcPct val="100000"/>
+                  </a:lnSpc>
+                  <a:spcBef>
+                    <a:spcPct val="0"/>
+                  </a:spcBef>
+                  <a:spcAft>
+                    <a:spcPct val="0"/>
+                  </a:spcAft>
+                  <a:buClrTx/>
+                  <a:buSzTx/>
+                  <a:buFontTx/>
+                  <a:buNone/>
+                  <a:tabLst/>
+                </a:pPr>
+                <a:endParaRPr kumimoji="0" lang="en-US" sz="2400" b="0" i="0" u="none" strike="noStrike" cap="none" normalizeH="0" baseline="0">
+                  <a:ln>
+                    <a:noFill/>
+                  </a:ln>
+                  <a:solidFill>
+                    <a:schemeClr val="tx1"/>
+                  </a:solidFill>
+                  <a:effectLst/>
+                  <a:latin typeface="Arial" charset="0"/>
+                </a:endParaRPr>
+              </a:p>
+            </p:txBody>
+          </p:sp>
+        </p:grpSp>
+        <p:grpSp>
+          <p:nvGrpSpPr>
+            <p:cNvPr id="46" name="Group 45">
+              <a:extLst>
+                <a:ext uri="{FF2B5EF4-FFF2-40B4-BE49-F238E27FC236}">
+                  <a16:creationId xmlns:a16="http://schemas.microsoft.com/office/drawing/2014/main" id="{1437F269-4451-3664-5E63-70820750BAC0}"/>
+                </a:ext>
+              </a:extLst>
+            </p:cNvPr>
+            <p:cNvGrpSpPr/>
+            <p:nvPr/>
+          </p:nvGrpSpPr>
+          <p:grpSpPr>
+            <a:xfrm>
+              <a:off x="6970296" y="5486400"/>
+              <a:ext cx="1645920" cy="830997"/>
+              <a:chOff x="7120434" y="4911022"/>
+              <a:chExt cx="1645920" cy="830997"/>
+            </a:xfrm>
+          </p:grpSpPr>
+          <p:sp>
+            <p:nvSpPr>
+              <p:cNvPr id="66" name="TextBox 65">
+                <a:extLst>
+                  <a:ext uri="{FF2B5EF4-FFF2-40B4-BE49-F238E27FC236}">
+                    <a16:creationId xmlns:a16="http://schemas.microsoft.com/office/drawing/2014/main" id="{2C5C29CF-6F69-4D24-DD89-36D2A784D579}"/>
+                  </a:ext>
+                </a:extLst>
+              </p:cNvPr>
+              <p:cNvSpPr txBox="1"/>
+              <p:nvPr/>
+            </p:nvSpPr>
+            <p:spPr>
+              <a:xfrm>
+                <a:off x="7120434" y="4911022"/>
+                <a:ext cx="1645920" cy="830997"/>
+              </a:xfrm>
+              <a:prstGeom prst="rect">
+                <a:avLst/>
+              </a:prstGeom>
+              <a:noFill/>
+              <a:ln>
+                <a:solidFill>
+                  <a:schemeClr val="tx1"/>
+                </a:solidFill>
+              </a:ln>
+            </p:spPr>
+            <p:txBody>
+              <a:bodyPr wrap="none" rtlCol="0">
+                <a:spAutoFit/>
+              </a:bodyPr>
+              <a:lstStyle>
+                <a:defPPr>
+                  <a:defRPr lang="en-US"/>
+                </a:defPPr>
+              </a:lstStyle>
+              <a:p>
+                <a:pPr algn="l"/>
+                <a:r>
+                  <a:rPr lang="en-US" sz="1600" dirty="0"/>
+                  <a:t>   </a:t>
+                </a:r>
+                <a:r>
+                  <a:rPr lang="en-US" sz="1600" dirty="0" err="1"/>
+                  <a:t>VariableExpr</a:t>
+                </a:r>
+                <a:endParaRPr lang="en-US" sz="1600" dirty="0"/>
+              </a:p>
+              <a:p>
+                <a:pPr algn="l"/>
+                <a:r>
+                  <a:rPr lang="en-US" sz="1600" dirty="0"/>
+                  <a:t>decl  </a:t>
+                </a:r>
+              </a:p>
+              <a:p>
+                <a:pPr algn="l"/>
+                <a:r>
+                  <a:rPr lang="en-US" sz="1600" dirty="0"/>
+                  <a:t>position : (4, 12)</a:t>
+                </a:r>
+              </a:p>
+            </p:txBody>
+          </p:sp>
+          <p:sp>
+            <p:nvSpPr>
+              <p:cNvPr id="67" name="Oval 66">
+                <a:extLst>
+                  <a:ext uri="{FF2B5EF4-FFF2-40B4-BE49-F238E27FC236}">
+                    <a16:creationId xmlns:a16="http://schemas.microsoft.com/office/drawing/2014/main" id="{98BF5D9B-1336-8E49-F4F0-4514FD5CE2D1}"/>
+                  </a:ext>
+                </a:extLst>
+              </p:cNvPr>
+              <p:cNvSpPr/>
+              <p:nvPr/>
+            </p:nvSpPr>
+            <p:spPr bwMode="auto">
+              <a:xfrm>
+                <a:off x="7696200" y="5293029"/>
+                <a:ext cx="85989" cy="85989"/>
+              </a:xfrm>
+              <a:prstGeom prst="ellipse">
+                <a:avLst/>
+              </a:prstGeom>
+              <a:solidFill>
+                <a:schemeClr val="tx1"/>
+              </a:solidFill>
+              <a:ln w="9525" cap="flat" cmpd="sng" algn="ctr">
+                <a:solidFill>
+                  <a:schemeClr val="tx1"/>
+                </a:solidFill>
+                <a:prstDash val="solid"/>
+                <a:round/>
+                <a:headEnd type="none" w="med" len="med"/>
+                <a:tailEnd type="none" w="med" len="med"/>
+              </a:ln>
+              <a:effectLst/>
+            </p:spPr>
+            <p:txBody>
+              <a:bodyPr vert="horz" wrap="none" lIns="92075" tIns="46038" rIns="92075" bIns="46038" numCol="1" rtlCol="0" anchor="ctr" anchorCtr="0" compatLnSpc="1">
+                <a:prstTxWarp prst="textNoShape">
+                  <a:avLst/>
+                </a:prstTxWarp>
+              </a:bodyPr>
+              <a:lstStyle/>
+              <a:p>
+                <a:pPr marL="0" marR="0" indent="0" algn="l" defTabSz="914400" rtl="0" eaLnBrk="0" fontAlgn="base" latinLnBrk="0" hangingPunct="0">
+                  <a:lnSpc>
+                    <a:spcPct val="100000"/>
+                  </a:lnSpc>
+                  <a:spcBef>
+                    <a:spcPct val="0"/>
+                  </a:spcBef>
+                  <a:spcAft>
+                    <a:spcPct val="0"/>
+                  </a:spcAft>
+                  <a:buClrTx/>
+                  <a:buSzTx/>
+                  <a:buFontTx/>
+                  <a:buNone/>
+                  <a:tabLst/>
+                </a:pPr>
+                <a:endParaRPr kumimoji="0" lang="en-US" sz="2400" b="0" i="0" u="none" strike="noStrike" cap="none" normalizeH="0" baseline="0">
+                  <a:ln>
+                    <a:noFill/>
+                  </a:ln>
+                  <a:solidFill>
+                    <a:schemeClr val="tx1"/>
+                  </a:solidFill>
+                  <a:effectLst/>
+                  <a:latin typeface="Arial" charset="0"/>
+                </a:endParaRPr>
+              </a:p>
+            </p:txBody>
+          </p:sp>
+        </p:grpSp>
+        <p:cxnSp>
+          <p:nvCxnSpPr>
+            <p:cNvPr id="50" name="Elbow Connector 26">
+              <a:extLst>
+                <a:ext uri="{FF2B5EF4-FFF2-40B4-BE49-F238E27FC236}">
+                  <a16:creationId xmlns:a16="http://schemas.microsoft.com/office/drawing/2014/main" id="{2505A9B5-7507-4A99-15DB-7ED1E566EB1A}"/>
+                </a:ext>
+              </a:extLst>
+            </p:cNvPr>
+            <p:cNvCxnSpPr>
+              <a:cxnSpLocks/>
+              <a:stCxn id="71" idx="2"/>
+              <a:endCxn id="64" idx="0"/>
+            </p:cNvCxnSpPr>
+            <p:nvPr/>
+          </p:nvCxnSpPr>
+          <p:spPr bwMode="auto">
+            <a:xfrm rot="10800000" flipV="1">
+              <a:off x="3533837" y="4462534"/>
+              <a:ext cx="439297" cy="1023866"/>
+            </a:xfrm>
+            <a:prstGeom prst="bentConnector2">
+              <a:avLst/>
+            </a:prstGeom>
+            <a:noFill/>
+            <a:ln w="9525" cap="flat" cmpd="sng" algn="ctr">
+              <a:solidFill>
+                <a:schemeClr val="tx1"/>
+              </a:solidFill>
+              <a:prstDash val="solid"/>
+              <a:round/>
+              <a:headEnd type="none" w="med" len="med"/>
+              <a:tailEnd type="triangle"/>
+            </a:ln>
+            <a:effectLst/>
+          </p:spPr>
+        </p:cxnSp>
+        <p:cxnSp>
+          <p:nvCxnSpPr>
+            <p:cNvPr id="51" name="Elbow Connector 28">
+              <a:extLst>
+                <a:ext uri="{FF2B5EF4-FFF2-40B4-BE49-F238E27FC236}">
+                  <a16:creationId xmlns:a16="http://schemas.microsoft.com/office/drawing/2014/main" id="{56E4F54C-A544-D2C0-1BB5-36CB4A46C810}"/>
+                </a:ext>
+              </a:extLst>
+            </p:cNvPr>
+            <p:cNvCxnSpPr>
+              <a:stCxn id="72" idx="6"/>
+              <a:endCxn id="37" idx="0"/>
+            </p:cNvCxnSpPr>
+            <p:nvPr/>
+          </p:nvCxnSpPr>
+          <p:spPr bwMode="auto">
+            <a:xfrm>
+              <a:off x="5188516" y="4700923"/>
+              <a:ext cx="663841" cy="785477"/>
+            </a:xfrm>
+            <a:prstGeom prst="bentConnector2">
+              <a:avLst/>
+            </a:prstGeom>
+            <a:noFill/>
+            <a:ln w="9525" cap="flat" cmpd="sng" algn="ctr">
+              <a:solidFill>
+                <a:schemeClr val="tx1"/>
+              </a:solidFill>
+              <a:prstDash val="solid"/>
+              <a:round/>
+              <a:headEnd type="none" w="med" len="med"/>
+              <a:tailEnd type="triangle"/>
+            </a:ln>
+            <a:effectLst/>
+          </p:spPr>
+        </p:cxnSp>
+        <p:grpSp>
+          <p:nvGrpSpPr>
+            <p:cNvPr id="52" name="Group 51">
+              <a:extLst>
+                <a:ext uri="{FF2B5EF4-FFF2-40B4-BE49-F238E27FC236}">
+                  <a16:creationId xmlns:a16="http://schemas.microsoft.com/office/drawing/2014/main" id="{ADFDD6ED-9C59-7476-ED17-685A5B1846FB}"/>
+                </a:ext>
+              </a:extLst>
+            </p:cNvPr>
+            <p:cNvGrpSpPr/>
+            <p:nvPr/>
+          </p:nvGrpSpPr>
+          <p:grpSpPr>
+            <a:xfrm>
+              <a:off x="2756596" y="5486400"/>
+              <a:ext cx="1554480" cy="830997"/>
+              <a:chOff x="2819400" y="4911022"/>
+              <a:chExt cx="1554480" cy="830997"/>
+            </a:xfrm>
+          </p:grpSpPr>
+          <p:sp>
+            <p:nvSpPr>
+              <p:cNvPr id="64" name="TextBox 63">
+                <a:extLst>
+                  <a:ext uri="{FF2B5EF4-FFF2-40B4-BE49-F238E27FC236}">
+                    <a16:creationId xmlns:a16="http://schemas.microsoft.com/office/drawing/2014/main" id="{B93D2770-3618-D33F-E372-C64F2E662CB6}"/>
+                  </a:ext>
+                </a:extLst>
+              </p:cNvPr>
+              <p:cNvSpPr txBox="1"/>
+              <p:nvPr/>
+            </p:nvSpPr>
+            <p:spPr>
+              <a:xfrm>
+                <a:off x="2819400" y="4911022"/>
+                <a:ext cx="1554480" cy="830997"/>
+              </a:xfrm>
+              <a:prstGeom prst="rect">
+                <a:avLst/>
+              </a:prstGeom>
+              <a:noFill/>
+              <a:ln>
+                <a:solidFill>
+                  <a:schemeClr val="tx1"/>
+                </a:solidFill>
+              </a:ln>
+            </p:spPr>
+            <p:txBody>
+              <a:bodyPr wrap="none" rtlCol="0">
+                <a:spAutoFit/>
+              </a:bodyPr>
+              <a:lstStyle>
+                <a:defPPr>
+                  <a:defRPr lang="en-US"/>
+                </a:defPPr>
+              </a:lstStyle>
+              <a:p>
+                <a:pPr algn="l"/>
+                <a:r>
+                  <a:rPr lang="en-US" sz="1600" dirty="0"/>
+                  <a:t>      Variable</a:t>
+                </a:r>
+              </a:p>
+              <a:p>
+                <a:pPr algn="l"/>
+                <a:r>
+                  <a:rPr lang="en-US" sz="1600" dirty="0"/>
+                  <a:t>     decl </a:t>
+                </a:r>
+              </a:p>
+              <a:p>
+                <a:pPr algn="l"/>
+                <a:r>
+                  <a:rPr lang="en-US" sz="1600" dirty="0"/>
+                  <a:t>position : (3, 4)</a:t>
+                </a:r>
+              </a:p>
+            </p:txBody>
+          </p:sp>
+          <p:sp>
+            <p:nvSpPr>
+              <p:cNvPr id="65" name="Oval 64">
+                <a:extLst>
+                  <a:ext uri="{FF2B5EF4-FFF2-40B4-BE49-F238E27FC236}">
+                    <a16:creationId xmlns:a16="http://schemas.microsoft.com/office/drawing/2014/main" id="{40510D1F-6B7B-EE6B-2C45-58CCEFDBA049}"/>
+                  </a:ext>
+                </a:extLst>
+              </p:cNvPr>
+              <p:cNvSpPr/>
+              <p:nvPr/>
+            </p:nvSpPr>
+            <p:spPr bwMode="auto">
+              <a:xfrm>
+                <a:off x="2964922" y="5293029"/>
+                <a:ext cx="85989" cy="85989"/>
+              </a:xfrm>
+              <a:prstGeom prst="ellipse">
+                <a:avLst/>
+              </a:prstGeom>
+              <a:solidFill>
+                <a:schemeClr val="tx1"/>
+              </a:solidFill>
+              <a:ln w="9525" cap="flat" cmpd="sng" algn="ctr">
+                <a:solidFill>
+                  <a:schemeClr val="tx1"/>
+                </a:solidFill>
+                <a:prstDash val="solid"/>
+                <a:round/>
+                <a:headEnd type="none" w="med" len="med"/>
+                <a:tailEnd type="none" w="med" len="med"/>
+              </a:ln>
+              <a:effectLst/>
+            </p:spPr>
+            <p:txBody>
+              <a:bodyPr vert="horz" wrap="none" lIns="92075" tIns="46038" rIns="92075" bIns="46038" numCol="1" rtlCol="0" anchor="ctr" anchorCtr="0" compatLnSpc="1">
+                <a:prstTxWarp prst="textNoShape">
+                  <a:avLst/>
+                </a:prstTxWarp>
+              </a:bodyPr>
+              <a:lstStyle/>
+              <a:p>
+                <a:pPr marL="0" marR="0" indent="0" algn="l" defTabSz="914400" rtl="0" eaLnBrk="0" fontAlgn="base" latinLnBrk="0" hangingPunct="0">
+                  <a:lnSpc>
+                    <a:spcPct val="100000"/>
+                  </a:lnSpc>
+                  <a:spcBef>
+                    <a:spcPct val="0"/>
+                  </a:spcBef>
+                  <a:spcAft>
+                    <a:spcPct val="0"/>
+                  </a:spcAft>
+                  <a:buClrTx/>
+                  <a:buSzTx/>
+                  <a:buFontTx/>
+                  <a:buNone/>
+                  <a:tabLst/>
+                </a:pPr>
+                <a:endParaRPr kumimoji="0" lang="en-US" sz="2400" b="0" i="0" u="none" strike="noStrike" cap="none" normalizeH="0" baseline="0">
+                  <a:ln>
+                    <a:noFill/>
+                  </a:ln>
+                  <a:solidFill>
+                    <a:schemeClr val="tx1"/>
+                  </a:solidFill>
+                  <a:effectLst/>
+                  <a:latin typeface="Arial" charset="0"/>
+                </a:endParaRPr>
+              </a:p>
+            </p:txBody>
+          </p:sp>
+        </p:grpSp>
+        <p:cxnSp>
+          <p:nvCxnSpPr>
+            <p:cNvPr id="53" name="Elbow Connector 35">
+              <a:extLst>
+                <a:ext uri="{FF2B5EF4-FFF2-40B4-BE49-F238E27FC236}">
+                  <a16:creationId xmlns:a16="http://schemas.microsoft.com/office/drawing/2014/main" id="{30264C41-3C7E-3A2E-2054-492FCD1A46CB}"/>
+                </a:ext>
+              </a:extLst>
+            </p:cNvPr>
+            <p:cNvCxnSpPr>
+              <a:cxnSpLocks/>
+              <a:stCxn id="69" idx="4"/>
+              <a:endCxn id="66" idx="0"/>
+            </p:cNvCxnSpPr>
+            <p:nvPr/>
+          </p:nvCxnSpPr>
+          <p:spPr bwMode="auto">
+            <a:xfrm flipH="1">
+              <a:off x="7793256" y="4515256"/>
+              <a:ext cx="1746" cy="971144"/>
+            </a:xfrm>
+            <a:prstGeom prst="straightConnector1">
+              <a:avLst/>
+            </a:prstGeom>
+            <a:noFill/>
+            <a:ln w="9525" cap="flat" cmpd="sng" algn="ctr">
+              <a:solidFill>
+                <a:schemeClr val="tx1"/>
+              </a:solidFill>
+              <a:prstDash val="solid"/>
+              <a:round/>
+              <a:headEnd type="none" w="med" len="med"/>
+              <a:tailEnd type="triangle"/>
+            </a:ln>
+            <a:effectLst/>
+          </p:spPr>
+        </p:cxnSp>
+        <p:cxnSp>
+          <p:nvCxnSpPr>
+            <p:cNvPr id="54" name="Elbow Connector 38">
+              <a:extLst>
+                <a:ext uri="{FF2B5EF4-FFF2-40B4-BE49-F238E27FC236}">
+                  <a16:creationId xmlns:a16="http://schemas.microsoft.com/office/drawing/2014/main" id="{D5DA15CE-F110-94C8-A837-C98D25D1FAEF}"/>
+                </a:ext>
+              </a:extLst>
+            </p:cNvPr>
+            <p:cNvCxnSpPr>
+              <a:cxnSpLocks/>
+              <a:stCxn id="67" idx="6"/>
+              <a:endCxn id="35" idx="2"/>
+            </p:cNvCxnSpPr>
+            <p:nvPr/>
+          </p:nvCxnSpPr>
+          <p:spPr bwMode="auto">
+            <a:xfrm flipH="1" flipV="1">
+              <a:off x="1566696" y="4679638"/>
+              <a:ext cx="6065355" cy="1231764"/>
+            </a:xfrm>
+            <a:prstGeom prst="bentConnector4">
+              <a:avLst>
+                <a:gd name="adj1" fmla="val -3769"/>
+                <a:gd name="adj2" fmla="val 51745"/>
+              </a:avLst>
+            </a:prstGeom>
+            <a:noFill/>
+            <a:ln w="9525" cap="flat" cmpd="sng" algn="ctr">
+              <a:solidFill>
+                <a:schemeClr val="tx1"/>
+              </a:solidFill>
+              <a:prstDash val="dash"/>
+              <a:round/>
+              <a:headEnd type="none" w="med" len="med"/>
+              <a:tailEnd type="triangle"/>
+            </a:ln>
+            <a:effectLst/>
+          </p:spPr>
+        </p:cxnSp>
+        <p:cxnSp>
+          <p:nvCxnSpPr>
+            <p:cNvPr id="55" name="Elbow Connector 40">
+              <a:extLst>
+                <a:ext uri="{FF2B5EF4-FFF2-40B4-BE49-F238E27FC236}">
+                  <a16:creationId xmlns:a16="http://schemas.microsoft.com/office/drawing/2014/main" id="{0D69B646-5948-DF28-A771-A3E797A08279}"/>
+                </a:ext>
+              </a:extLst>
+            </p:cNvPr>
+            <p:cNvCxnSpPr>
+              <a:stCxn id="65" idx="2"/>
+              <a:endCxn id="35" idx="2"/>
+            </p:cNvCxnSpPr>
+            <p:nvPr/>
+          </p:nvCxnSpPr>
+          <p:spPr bwMode="auto">
+            <a:xfrm rot="10800000">
+              <a:off x="1566696" y="4679638"/>
+              <a:ext cx="1335422" cy="1231764"/>
+            </a:xfrm>
+            <a:prstGeom prst="bentConnector2">
+              <a:avLst/>
+            </a:prstGeom>
+            <a:noFill/>
+            <a:ln w="9525" cap="flat" cmpd="sng" algn="ctr">
+              <a:solidFill>
+                <a:schemeClr val="tx1"/>
+              </a:solidFill>
+              <a:prstDash val="dash"/>
+              <a:round/>
+              <a:headEnd type="none" w="med" len="med"/>
+              <a:tailEnd type="triangle"/>
+            </a:ln>
+            <a:effectLst/>
+          </p:spPr>
+        </p:cxnSp>
         <p:sp>
           <p:nvSpPr>
-            <p:cNvPr id="66" name="TextBox 65">
+            <p:cNvPr id="56" name="TextBox 55">
               <a:extLst>
                 <a:ext uri="{FF2B5EF4-FFF2-40B4-BE49-F238E27FC236}">
-                  <a16:creationId xmlns:a16="http://schemas.microsoft.com/office/drawing/2014/main" id="{2C5C29CF-6F69-4D24-DD89-36D2A784D579}"/>
+                  <a16:creationId xmlns:a16="http://schemas.microsoft.com/office/drawing/2014/main" id="{67E5158D-7081-3EE3-9EA6-0B8066D04C86}"/>
                 </a:ext>
               </a:extLst>
             </p:cNvPr>
@@ -26364,8 +26924,8 @@
           </p:nvSpPr>
           <p:spPr>
             <a:xfrm>
-              <a:off x="7120434" y="4911022"/>
-              <a:ext cx="1645920" cy="830997"/>
+              <a:off x="1020712" y="1981200"/>
+              <a:ext cx="1091966" cy="338554"/>
             </a:xfrm>
             <a:prstGeom prst="rect">
               <a:avLst/>
@@ -26387,204 +26947,21 @@
               </a:defPPr>
             </a:lstStyle>
             <a:p>
-              <a:pPr algn="l"/>
-              <a:r>
-                <a:rPr lang="en-US" sz="1600" dirty="0"/>
-                <a:t>   </a:t>
-              </a:r>
+              <a:pPr algn="ctr"/>
               <a:r>
                 <a:rPr lang="en-US" sz="1600" dirty="0" err="1"/>
-                <a:t>VariableExpr</a:t>
+                <a:t>InitialDecls</a:t>
               </a:r>
               <a:endParaRPr lang="en-US" sz="1600" dirty="0"/>
-            </a:p>
-            <a:p>
-              <a:pPr algn="l"/>
-              <a:r>
-                <a:rPr lang="en-US" sz="1600" dirty="0"/>
-                <a:t>decl  </a:t>
-              </a:r>
-            </a:p>
-            <a:p>
-              <a:pPr algn="l"/>
-              <a:r>
-                <a:rPr lang="en-US" sz="1600" dirty="0"/>
-                <a:t>position : (4, 12)</a:t>
-              </a:r>
             </a:p>
           </p:txBody>
         </p:sp>
         <p:sp>
           <p:nvSpPr>
-            <p:cNvPr id="67" name="Oval 66">
+            <p:cNvPr id="57" name="TextBox 56">
               <a:extLst>
                 <a:ext uri="{FF2B5EF4-FFF2-40B4-BE49-F238E27FC236}">
-                  <a16:creationId xmlns:a16="http://schemas.microsoft.com/office/drawing/2014/main" id="{98BF5D9B-1336-8E49-F4F0-4514FD5CE2D1}"/>
-                </a:ext>
-              </a:extLst>
-            </p:cNvPr>
-            <p:cNvSpPr/>
-            <p:nvPr/>
-          </p:nvSpPr>
-          <p:spPr bwMode="auto">
-            <a:xfrm>
-              <a:off x="7696200" y="5293029"/>
-              <a:ext cx="85989" cy="85989"/>
-            </a:xfrm>
-            <a:prstGeom prst="ellipse">
-              <a:avLst/>
-            </a:prstGeom>
-            <a:solidFill>
-              <a:schemeClr val="tx1"/>
-            </a:solidFill>
-            <a:ln w="9525" cap="flat" cmpd="sng" algn="ctr">
-              <a:solidFill>
-                <a:schemeClr val="tx1"/>
-              </a:solidFill>
-              <a:prstDash val="solid"/>
-              <a:round/>
-              <a:headEnd type="none" w="med" len="med"/>
-              <a:tailEnd type="none" w="med" len="med"/>
-            </a:ln>
-            <a:effectLst/>
-          </p:spPr>
-          <p:txBody>
-            <a:bodyPr vert="horz" wrap="none" lIns="92075" tIns="46038" rIns="92075" bIns="46038" numCol="1" rtlCol="0" anchor="ctr" anchorCtr="0" compatLnSpc="1">
-              <a:prstTxWarp prst="textNoShape">
-                <a:avLst/>
-              </a:prstTxWarp>
-            </a:bodyPr>
-            <a:lstStyle/>
-            <a:p>
-              <a:pPr marL="0" marR="0" indent="0" algn="l" defTabSz="914400" rtl="0" eaLnBrk="0" fontAlgn="base" latinLnBrk="0" hangingPunct="0">
-                <a:lnSpc>
-                  <a:spcPct val="100000"/>
-                </a:lnSpc>
-                <a:spcBef>
-                  <a:spcPct val="0"/>
-                </a:spcBef>
-                <a:spcAft>
-                  <a:spcPct val="0"/>
-                </a:spcAft>
-                <a:buClrTx/>
-                <a:buSzTx/>
-                <a:buFontTx/>
-                <a:buNone/>
-                <a:tabLst/>
-              </a:pPr>
-              <a:endParaRPr kumimoji="0" lang="en-US" sz="2400" b="0" i="0" u="none" strike="noStrike" cap="none" normalizeH="0" baseline="0">
-                <a:ln>
-                  <a:noFill/>
-                </a:ln>
-                <a:solidFill>
-                  <a:schemeClr val="tx1"/>
-                </a:solidFill>
-                <a:effectLst/>
-                <a:latin typeface="Arial" charset="0"/>
-              </a:endParaRPr>
-            </a:p>
-          </p:txBody>
-        </p:sp>
-      </p:grpSp>
-      <p:cxnSp>
-        <p:nvCxnSpPr>
-          <p:cNvPr id="50" name="Elbow Connector 26">
-            <a:extLst>
-              <a:ext uri="{FF2B5EF4-FFF2-40B4-BE49-F238E27FC236}">
-                <a16:creationId xmlns:a16="http://schemas.microsoft.com/office/drawing/2014/main" id="{2505A9B5-7507-4A99-15DB-7ED1E566EB1A}"/>
-              </a:ext>
-            </a:extLst>
-          </p:cNvPr>
-          <p:cNvCxnSpPr>
-            <a:cxnSpLocks/>
-            <a:stCxn id="71" idx="2"/>
-            <a:endCxn id="64" idx="0"/>
-          </p:cNvCxnSpPr>
-          <p:nvPr/>
-        </p:nvCxnSpPr>
-        <p:spPr bwMode="auto">
-          <a:xfrm rot="10800000" flipV="1">
-            <a:off x="3533837" y="4462534"/>
-            <a:ext cx="439297" cy="1023866"/>
-          </a:xfrm>
-          <a:prstGeom prst="bentConnector2">
-            <a:avLst/>
-          </a:prstGeom>
-          <a:noFill/>
-          <a:ln w="9525" cap="flat" cmpd="sng" algn="ctr">
-            <a:solidFill>
-              <a:schemeClr val="tx1"/>
-            </a:solidFill>
-            <a:prstDash val="solid"/>
-            <a:round/>
-            <a:headEnd type="none" w="med" len="med"/>
-            <a:tailEnd type="triangle"/>
-          </a:ln>
-          <a:effectLst/>
-        </p:spPr>
-      </p:cxnSp>
-      <p:cxnSp>
-        <p:nvCxnSpPr>
-          <p:cNvPr id="51" name="Elbow Connector 28">
-            <a:extLst>
-              <a:ext uri="{FF2B5EF4-FFF2-40B4-BE49-F238E27FC236}">
-                <a16:creationId xmlns:a16="http://schemas.microsoft.com/office/drawing/2014/main" id="{56E4F54C-A544-D2C0-1BB5-36CB4A46C810}"/>
-              </a:ext>
-            </a:extLst>
-          </p:cNvPr>
-          <p:cNvCxnSpPr>
-            <a:stCxn id="72" idx="6"/>
-            <a:endCxn id="37" idx="0"/>
-          </p:cNvCxnSpPr>
-          <p:nvPr/>
-        </p:nvCxnSpPr>
-        <p:spPr bwMode="auto">
-          <a:xfrm>
-            <a:off x="5188516" y="4700923"/>
-            <a:ext cx="663841" cy="785477"/>
-          </a:xfrm>
-          <a:prstGeom prst="bentConnector2">
-            <a:avLst/>
-          </a:prstGeom>
-          <a:noFill/>
-          <a:ln w="9525" cap="flat" cmpd="sng" algn="ctr">
-            <a:solidFill>
-              <a:schemeClr val="tx1"/>
-            </a:solidFill>
-            <a:prstDash val="solid"/>
-            <a:round/>
-            <a:headEnd type="none" w="med" len="med"/>
-            <a:tailEnd type="triangle"/>
-          </a:ln>
-          <a:effectLst/>
-        </p:spPr>
-      </p:cxnSp>
-      <p:grpSp>
-        <p:nvGrpSpPr>
-          <p:cNvPr id="52" name="Group 51">
-            <a:extLst>
-              <a:ext uri="{FF2B5EF4-FFF2-40B4-BE49-F238E27FC236}">
-                <a16:creationId xmlns:a16="http://schemas.microsoft.com/office/drawing/2014/main" id="{ADFDD6ED-9C59-7476-ED17-685A5B1846FB}"/>
-              </a:ext>
-            </a:extLst>
-          </p:cNvPr>
-          <p:cNvGrpSpPr/>
-          <p:nvPr/>
-        </p:nvGrpSpPr>
-        <p:grpSpPr>
-          <a:xfrm>
-            <a:off x="2756596" y="5486400"/>
-            <a:ext cx="1554480" cy="830997"/>
-            <a:chOff x="2819400" y="4911022"/>
-            <a:chExt cx="1554480" cy="830997"/>
-          </a:xfrm>
-        </p:grpSpPr>
-        <p:sp>
-          <p:nvSpPr>
-            <p:cNvPr id="64" name="TextBox 63">
-              <a:extLst>
-                <a:ext uri="{FF2B5EF4-FFF2-40B4-BE49-F238E27FC236}">
-                  <a16:creationId xmlns:a16="http://schemas.microsoft.com/office/drawing/2014/main" id="{B93D2770-3618-D33F-E372-C64F2E662CB6}"/>
+                  <a16:creationId xmlns:a16="http://schemas.microsoft.com/office/drawing/2014/main" id="{A710BA51-DAB2-91C2-9400-B62ACC5F8379}"/>
                 </a:ext>
               </a:extLst>
             </p:cNvPr>
@@ -26593,8 +26970,8 @@
           </p:nvSpPr>
           <p:spPr>
             <a:xfrm>
-              <a:off x="2819400" y="4911022"/>
-              <a:ext cx="1554480" cy="830997"/>
+              <a:off x="5560717" y="3388132"/>
+              <a:ext cx="1131527" cy="338554"/>
             </a:xfrm>
             <a:prstGeom prst="rect">
               <a:avLst/>
@@ -26616,51 +26993,39 @@
               </a:defPPr>
             </a:lstStyle>
             <a:p>
-              <a:pPr algn="l"/>
+              <a:pPr algn="ctr"/>
               <a:r>
                 <a:rPr lang="en-US" sz="1600" dirty="0"/>
-                <a:t>      Variable</a:t>
-              </a:r>
-            </a:p>
-            <a:p>
-              <a:pPr algn="l"/>
-              <a:r>
-                <a:rPr lang="en-US" sz="1600" dirty="0"/>
-                <a:t>     decl </a:t>
-              </a:r>
-            </a:p>
-            <a:p>
-              <a:pPr algn="l"/>
-              <a:r>
-                <a:rPr lang="en-US" sz="1600" dirty="0"/>
-                <a:t>position : (3, 4)</a:t>
+                <a:t>Statements</a:t>
               </a:r>
             </a:p>
           </p:txBody>
         </p:sp>
-        <p:sp>
-          <p:nvSpPr>
-            <p:cNvPr id="65" name="Oval 64">
+        <p:cxnSp>
+          <p:nvCxnSpPr>
+            <p:cNvPr id="58" name="Elbow Connector 16">
               <a:extLst>
                 <a:ext uri="{FF2B5EF4-FFF2-40B4-BE49-F238E27FC236}">
-                  <a16:creationId xmlns:a16="http://schemas.microsoft.com/office/drawing/2014/main" id="{40510D1F-6B7B-EE6B-2C45-58CCEFDBA049}"/>
+                  <a16:creationId xmlns:a16="http://schemas.microsoft.com/office/drawing/2014/main" id="{85EF203B-FB21-D975-EE8B-8545B77EEEC3}"/>
                 </a:ext>
               </a:extLst>
             </p:cNvPr>
-            <p:cNvSpPr/>
+            <p:cNvCxnSpPr>
+              <a:cxnSpLocks/>
+              <a:stCxn id="56" idx="2"/>
+              <a:endCxn id="36" idx="0"/>
+            </p:cNvCxnSpPr>
             <p:nvPr/>
-          </p:nvSpPr>
+          </p:nvCxnSpPr>
           <p:spPr bwMode="auto">
             <a:xfrm>
-              <a:off x="2964922" y="5293029"/>
-              <a:ext cx="85989" cy="85989"/>
+              <a:off x="1566695" y="2319754"/>
+              <a:ext cx="0" cy="472056"/>
             </a:xfrm>
-            <a:prstGeom prst="ellipse">
+            <a:prstGeom prst="straightConnector1">
               <a:avLst/>
             </a:prstGeom>
-            <a:solidFill>
-              <a:schemeClr val="tx1"/>
-            </a:solidFill>
+            <a:noFill/>
             <a:ln w="9525" cap="flat" cmpd="sng" algn="ctr">
               <a:solidFill>
                 <a:schemeClr val="tx1"/>
@@ -26668,496 +27033,290 @@
               <a:prstDash val="solid"/>
               <a:round/>
               <a:headEnd type="none" w="med" len="med"/>
-              <a:tailEnd type="none" w="med" len="med"/>
+              <a:tailEnd type="triangle"/>
             </a:ln>
             <a:effectLst/>
           </p:spPr>
+        </p:cxnSp>
+        <p:cxnSp>
+          <p:nvCxnSpPr>
+            <p:cNvPr id="59" name="Elbow Connector 16">
+              <a:extLst>
+                <a:ext uri="{FF2B5EF4-FFF2-40B4-BE49-F238E27FC236}">
+                  <a16:creationId xmlns:a16="http://schemas.microsoft.com/office/drawing/2014/main" id="{51137EF7-4A1A-A985-89D6-0DDCCB37A22A}"/>
+                </a:ext>
+              </a:extLst>
+            </p:cNvPr>
+            <p:cNvCxnSpPr>
+              <a:cxnSpLocks/>
+              <a:stCxn id="60" idx="2"/>
+              <a:endCxn id="34" idx="0"/>
+            </p:cNvCxnSpPr>
+            <p:nvPr/>
+          </p:nvCxnSpPr>
+          <p:spPr bwMode="auto">
+            <a:xfrm>
+              <a:off x="6126480" y="2319754"/>
+              <a:ext cx="0" cy="241802"/>
+            </a:xfrm>
+            <a:prstGeom prst="straightConnector1">
+              <a:avLst/>
+            </a:prstGeom>
+            <a:noFill/>
+            <a:ln w="9525" cap="flat" cmpd="sng" algn="ctr">
+              <a:solidFill>
+                <a:schemeClr val="tx1"/>
+              </a:solidFill>
+              <a:prstDash val="solid"/>
+              <a:round/>
+              <a:headEnd type="none" w="med" len="med"/>
+              <a:tailEnd type="triangle"/>
+            </a:ln>
+            <a:effectLst/>
+          </p:spPr>
+        </p:cxnSp>
+        <p:sp>
+          <p:nvSpPr>
+            <p:cNvPr id="60" name="TextBox 59">
+              <a:extLst>
+                <a:ext uri="{FF2B5EF4-FFF2-40B4-BE49-F238E27FC236}">
+                  <a16:creationId xmlns:a16="http://schemas.microsoft.com/office/drawing/2014/main" id="{D61ABAAD-0AAD-DD24-971D-21D1CBFAB8F6}"/>
+                </a:ext>
+              </a:extLst>
+            </p:cNvPr>
+            <p:cNvSpPr txBox="1"/>
+            <p:nvPr/>
+          </p:nvSpPr>
+          <p:spPr>
+            <a:xfrm>
+              <a:off x="5257800" y="1981200"/>
+              <a:ext cx="1737360" cy="338554"/>
+            </a:xfrm>
+            <a:prstGeom prst="rect">
+              <a:avLst/>
+            </a:prstGeom>
+            <a:noFill/>
+            <a:ln>
+              <a:solidFill>
+                <a:schemeClr val="tx1"/>
+              </a:solidFill>
+            </a:ln>
+          </p:spPr>
           <p:txBody>
-            <a:bodyPr vert="horz" wrap="none" lIns="92075" tIns="46038" rIns="92075" bIns="46038" numCol="1" rtlCol="0" anchor="ctr" anchorCtr="0" compatLnSpc="1">
-              <a:prstTxWarp prst="textNoShape">
-                <a:avLst/>
-              </a:prstTxWarp>
+            <a:bodyPr wrap="none" rtlCol="0">
+              <a:spAutoFit/>
             </a:bodyPr>
-            <a:lstStyle/>
+            <a:lstStyle>
+              <a:defPPr>
+                <a:defRPr lang="en-US"/>
+              </a:defPPr>
+            </a:lstStyle>
             <a:p>
-              <a:pPr marL="0" marR="0" indent="0" algn="l" defTabSz="914400" rtl="0" eaLnBrk="0" fontAlgn="base" latinLnBrk="0" hangingPunct="0">
-                <a:lnSpc>
-                  <a:spcPct val="100000"/>
-                </a:lnSpc>
-                <a:spcBef>
-                  <a:spcPct val="0"/>
-                </a:spcBef>
-                <a:spcAft>
-                  <a:spcPct val="0"/>
-                </a:spcAft>
-                <a:buClrTx/>
-                <a:buSzTx/>
-                <a:buFontTx/>
-                <a:buNone/>
-                <a:tabLst/>
-              </a:pPr>
-              <a:endParaRPr kumimoji="0" lang="en-US" sz="2400" b="0" i="0" u="none" strike="noStrike" cap="none" normalizeH="0" baseline="0">
-                <a:ln>
-                  <a:noFill/>
-                </a:ln>
-                <a:solidFill>
-                  <a:schemeClr val="tx1"/>
-                </a:solidFill>
-                <a:effectLst/>
-                <a:latin typeface="Arial" charset="0"/>
-              </a:endParaRPr>
+              <a:pPr algn="ctr"/>
+              <a:r>
+                <a:rPr lang="en-US" sz="1600" dirty="0" err="1"/>
+                <a:t>SubprogramDecls</a:t>
+              </a:r>
+              <a:endParaRPr lang="en-US" sz="1600" dirty="0"/>
             </a:p>
           </p:txBody>
         </p:sp>
+        <p:cxnSp>
+          <p:nvCxnSpPr>
+            <p:cNvPr id="63" name="Elbow Connector 16">
+              <a:extLst>
+                <a:ext uri="{FF2B5EF4-FFF2-40B4-BE49-F238E27FC236}">
+                  <a16:creationId xmlns:a16="http://schemas.microsoft.com/office/drawing/2014/main" id="{3BCC0B0E-3692-9DE2-E7A5-140798E4726F}"/>
+                </a:ext>
+              </a:extLst>
+            </p:cNvPr>
+            <p:cNvCxnSpPr>
+              <a:cxnSpLocks/>
+              <a:stCxn id="34" idx="2"/>
+              <a:endCxn id="57" idx="0"/>
+            </p:cNvCxnSpPr>
+            <p:nvPr/>
+          </p:nvCxnSpPr>
+          <p:spPr bwMode="auto">
+            <a:xfrm rot="16200000" flipH="1">
+              <a:off x="6005580" y="3267230"/>
+              <a:ext cx="241801" cy="1"/>
+            </a:xfrm>
+            <a:prstGeom prst="bentConnector3">
+              <a:avLst>
+                <a:gd name="adj1" fmla="val 50000"/>
+              </a:avLst>
+            </a:prstGeom>
+            <a:noFill/>
+            <a:ln w="9525" cap="flat" cmpd="sng" algn="ctr">
+              <a:solidFill>
+                <a:schemeClr val="tx1"/>
+              </a:solidFill>
+              <a:prstDash val="solid"/>
+              <a:round/>
+              <a:headEnd type="none" w="med" len="med"/>
+              <a:tailEnd type="triangle"/>
+            </a:ln>
+            <a:effectLst/>
+          </p:spPr>
+        </p:cxnSp>
+        <p:sp>
+          <p:nvSpPr>
+            <p:cNvPr id="36" name="TextBox 35">
+              <a:extLst>
+                <a:ext uri="{FF2B5EF4-FFF2-40B4-BE49-F238E27FC236}">
+                  <a16:creationId xmlns:a16="http://schemas.microsoft.com/office/drawing/2014/main" id="{282320C6-00EC-EE77-3632-8582B2DD2B83}"/>
+                </a:ext>
+              </a:extLst>
+            </p:cNvPr>
+            <p:cNvSpPr txBox="1"/>
+            <p:nvPr/>
+          </p:nvSpPr>
+          <p:spPr>
+            <a:xfrm>
+              <a:off x="1118110" y="2791810"/>
+              <a:ext cx="897170" cy="338554"/>
+            </a:xfrm>
+            <a:prstGeom prst="rect">
+              <a:avLst/>
+            </a:prstGeom>
+            <a:noFill/>
+            <a:ln>
+              <a:solidFill>
+                <a:schemeClr val="tx1"/>
+              </a:solidFill>
+            </a:ln>
+          </p:spPr>
+          <p:txBody>
+            <a:bodyPr wrap="none" rtlCol="0">
+              <a:spAutoFit/>
+            </a:bodyPr>
+            <a:lstStyle>
+              <a:defPPr>
+                <a:defRPr lang="en-US"/>
+              </a:defPPr>
+            </a:lstStyle>
+            <a:p>
+              <a:pPr algn="ctr"/>
+              <a:r>
+                <a:rPr lang="en-US" sz="1600" dirty="0"/>
+                <a:t>VarDecl</a:t>
+              </a:r>
+            </a:p>
+          </p:txBody>
+        </p:sp>
+        <p:cxnSp>
+          <p:nvCxnSpPr>
+            <p:cNvPr id="5" name="Straight Arrow Connector 4">
+              <a:extLst>
+                <a:ext uri="{FF2B5EF4-FFF2-40B4-BE49-F238E27FC236}">
+                  <a16:creationId xmlns:a16="http://schemas.microsoft.com/office/drawing/2014/main" id="{29AD9E0F-A348-CB6F-4EC4-8000B1CCA434}"/>
+                </a:ext>
+              </a:extLst>
+            </p:cNvPr>
+            <p:cNvCxnSpPr>
+              <a:stCxn id="36" idx="2"/>
+              <a:endCxn id="35" idx="0"/>
+            </p:cNvCxnSpPr>
+            <p:nvPr/>
+          </p:nvCxnSpPr>
+          <p:spPr bwMode="auto">
+            <a:xfrm>
+              <a:off x="1566695" y="3130364"/>
+              <a:ext cx="1" cy="472056"/>
+            </a:xfrm>
+            <a:prstGeom prst="straightConnector1">
+              <a:avLst/>
+            </a:prstGeom>
+            <a:noFill/>
+            <a:ln w="9525" cap="flat" cmpd="sng" algn="ctr">
+              <a:solidFill>
+                <a:schemeClr val="tx1"/>
+              </a:solidFill>
+              <a:prstDash val="solid"/>
+              <a:round/>
+              <a:headEnd type="none" w="med" len="med"/>
+              <a:tailEnd type="triangle"/>
+            </a:ln>
+            <a:effectLst/>
+          </p:spPr>
+        </p:cxnSp>
       </p:grpSp>
-      <p:cxnSp>
-        <p:nvCxnSpPr>
-          <p:cNvPr id="53" name="Elbow Connector 35">
+      <p:sp>
+        <p:nvSpPr>
+          <p:cNvPr id="3" name="Footer Placeholder 2">
             <a:extLst>
               <a:ext uri="{FF2B5EF4-FFF2-40B4-BE49-F238E27FC236}">
-                <a16:creationId xmlns:a16="http://schemas.microsoft.com/office/drawing/2014/main" id="{30264C41-3C7E-3A2E-2054-492FCD1A46CB}"/>
+                <a16:creationId xmlns:a16="http://schemas.microsoft.com/office/drawing/2014/main" id="{7B54FDFE-A571-03FB-AD33-A7533E49EC16}"/>
               </a:ext>
             </a:extLst>
           </p:cNvPr>
-          <p:cNvCxnSpPr>
-            <a:cxnSpLocks/>
-            <a:stCxn id="69" idx="4"/>
-            <a:endCxn id="66" idx="0"/>
-          </p:cNvCxnSpPr>
-          <p:nvPr/>
-        </p:nvCxnSpPr>
-        <p:spPr bwMode="auto">
-          <a:xfrm flipH="1">
-            <a:off x="7793256" y="4515256"/>
-            <a:ext cx="1746" cy="971144"/>
-          </a:xfrm>
-          <a:prstGeom prst="straightConnector1">
-            <a:avLst/>
-          </a:prstGeom>
-          <a:noFill/>
-          <a:ln w="9525" cap="flat" cmpd="sng" algn="ctr">
-            <a:solidFill>
-              <a:schemeClr val="tx1"/>
-            </a:solidFill>
-            <a:prstDash val="solid"/>
-            <a:round/>
-            <a:headEnd type="none" w="med" len="med"/>
-            <a:tailEnd type="triangle"/>
-          </a:ln>
-          <a:effectLst/>
-        </p:spPr>
-      </p:cxnSp>
-      <p:cxnSp>
-        <p:nvCxnSpPr>
-          <p:cNvPr id="54" name="Elbow Connector 38">
+          <p:cNvSpPr>
+            <a:spLocks noGrp="1"/>
+          </p:cNvSpPr>
+          <p:nvPr>
+            <p:ph type="ftr" sz="quarter" idx="10"/>
+          </p:nvPr>
+        </p:nvSpPr>
+        <p:spPr/>
+        <p:txBody>
+          <a:bodyPr/>
+          <a:lstStyle/>
+          <a:p>
+            <a:pPr>
+              <a:defRPr/>
+            </a:pPr>
+            <a:r>
+              <a:rPr lang="en-US"/>
+              <a:t>©SoftMoore Consulting</a:t>
+            </a:r>
+            <a:endParaRPr lang="en-US" dirty="0"/>
+          </a:p>
+        </p:txBody>
+      </p:sp>
+      <p:sp>
+        <p:nvSpPr>
+          <p:cNvPr id="6" name="Slide Number Placeholder 5">
             <a:extLst>
               <a:ext uri="{FF2B5EF4-FFF2-40B4-BE49-F238E27FC236}">
-                <a16:creationId xmlns:a16="http://schemas.microsoft.com/office/drawing/2014/main" id="{D5DA15CE-F110-94C8-A837-C98D25D1FAEF}"/>
+                <a16:creationId xmlns:a16="http://schemas.microsoft.com/office/drawing/2014/main" id="{6623A951-04F8-9C67-97B8-323C18D672F9}"/>
               </a:ext>
             </a:extLst>
           </p:cNvPr>
-          <p:cNvCxnSpPr>
-            <a:cxnSpLocks/>
-            <a:stCxn id="67" idx="6"/>
-            <a:endCxn id="35" idx="2"/>
-          </p:cNvCxnSpPr>
-          <p:nvPr/>
-        </p:nvCxnSpPr>
-        <p:spPr bwMode="auto">
-          <a:xfrm flipH="1" flipV="1">
-            <a:off x="1590576" y="4679638"/>
-            <a:ext cx="6041475" cy="1231764"/>
-          </a:xfrm>
-          <a:prstGeom prst="bentConnector4">
-            <a:avLst>
-              <a:gd name="adj1" fmla="val -19267"/>
-              <a:gd name="adj2" fmla="val 51745"/>
-            </a:avLst>
-          </a:prstGeom>
-          <a:noFill/>
-          <a:ln w="9525" cap="flat" cmpd="sng" algn="ctr">
-            <a:solidFill>
-              <a:schemeClr val="tx1"/>
-            </a:solidFill>
-            <a:prstDash val="dash"/>
-            <a:round/>
-            <a:headEnd type="none" w="med" len="med"/>
-            <a:tailEnd type="triangle"/>
-          </a:ln>
-          <a:effectLst/>
-        </p:spPr>
-      </p:cxnSp>
-      <p:cxnSp>
-        <p:nvCxnSpPr>
-          <p:cNvPr id="55" name="Elbow Connector 40">
-            <a:extLst>
-              <a:ext uri="{FF2B5EF4-FFF2-40B4-BE49-F238E27FC236}">
-                <a16:creationId xmlns:a16="http://schemas.microsoft.com/office/drawing/2014/main" id="{0D69B646-5948-DF28-A771-A3E797A08279}"/>
-              </a:ext>
-            </a:extLst>
-          </p:cNvPr>
-          <p:cNvCxnSpPr>
-            <a:stCxn id="65" idx="2"/>
-            <a:endCxn id="35" idx="2"/>
-          </p:cNvCxnSpPr>
-          <p:nvPr/>
-        </p:nvCxnSpPr>
-        <p:spPr bwMode="auto">
-          <a:xfrm rot="10800000">
-            <a:off x="1590576" y="4679638"/>
-            <a:ext cx="1311542" cy="1231764"/>
-          </a:xfrm>
-          <a:prstGeom prst="bentConnector2">
-            <a:avLst/>
-          </a:prstGeom>
-          <a:noFill/>
-          <a:ln w="9525" cap="flat" cmpd="sng" algn="ctr">
-            <a:solidFill>
-              <a:schemeClr val="tx1"/>
-            </a:solidFill>
-            <a:prstDash val="dash"/>
-            <a:round/>
-            <a:headEnd type="none" w="med" len="med"/>
-            <a:tailEnd type="triangle"/>
-          </a:ln>
-          <a:effectLst/>
-        </p:spPr>
-      </p:cxnSp>
-      <p:sp>
-        <p:nvSpPr>
-          <p:cNvPr id="56" name="TextBox 55">
-            <a:extLst>
-              <a:ext uri="{FF2B5EF4-FFF2-40B4-BE49-F238E27FC236}">
-                <a16:creationId xmlns:a16="http://schemas.microsoft.com/office/drawing/2014/main" id="{67E5158D-7081-3EE3-9EA6-0B8066D04C86}"/>
-              </a:ext>
-            </a:extLst>
-          </p:cNvPr>
-          <p:cNvSpPr txBox="1"/>
-          <p:nvPr/>
-        </p:nvSpPr>
-        <p:spPr>
-          <a:xfrm>
-            <a:off x="1044593" y="1981200"/>
-            <a:ext cx="1091966" cy="338554"/>
-          </a:xfrm>
-          <a:prstGeom prst="rect">
-            <a:avLst/>
-          </a:prstGeom>
-          <a:noFill/>
-          <a:ln>
-            <a:solidFill>
-              <a:schemeClr val="tx1"/>
-            </a:solidFill>
-          </a:ln>
-        </p:spPr>
-        <p:txBody>
-          <a:bodyPr wrap="none" rtlCol="0">
-            <a:spAutoFit/>
-          </a:bodyPr>
-          <a:lstStyle>
-            <a:defPPr>
-              <a:defRPr lang="en-US"/>
-            </a:defPPr>
-          </a:lstStyle>
-          <a:p>
-            <a:pPr algn="ctr"/>
-            <a:r>
-              <a:rPr lang="en-US" sz="1600" dirty="0" err="1"/>
-              <a:t>InitialDecls</a:t>
-            </a:r>
-            <a:endParaRPr lang="en-US" sz="1600" dirty="0"/>
-          </a:p>
-        </p:txBody>
-      </p:sp>
-      <p:sp>
-        <p:nvSpPr>
-          <p:cNvPr id="57" name="TextBox 56">
-            <a:extLst>
-              <a:ext uri="{FF2B5EF4-FFF2-40B4-BE49-F238E27FC236}">
-                <a16:creationId xmlns:a16="http://schemas.microsoft.com/office/drawing/2014/main" id="{A710BA51-DAB2-91C2-9400-B62ACC5F8379}"/>
-              </a:ext>
-            </a:extLst>
-          </p:cNvPr>
-          <p:cNvSpPr txBox="1"/>
-          <p:nvPr/>
-        </p:nvSpPr>
-        <p:spPr>
-          <a:xfrm>
-            <a:off x="5560717" y="3388132"/>
-            <a:ext cx="1131527" cy="338554"/>
-          </a:xfrm>
-          <a:prstGeom prst="rect">
-            <a:avLst/>
-          </a:prstGeom>
-          <a:noFill/>
-          <a:ln>
-            <a:solidFill>
-              <a:schemeClr val="tx1"/>
-            </a:solidFill>
-          </a:ln>
-        </p:spPr>
-        <p:txBody>
-          <a:bodyPr wrap="none" rtlCol="0">
-            <a:spAutoFit/>
-          </a:bodyPr>
-          <a:lstStyle>
-            <a:defPPr>
-              <a:defRPr lang="en-US"/>
-            </a:defPPr>
-          </a:lstStyle>
-          <a:p>
-            <a:pPr algn="ctr"/>
-            <a:r>
-              <a:rPr lang="en-US" sz="1600" dirty="0"/>
-              <a:t>Statements</a:t>
-            </a:r>
-          </a:p>
-        </p:txBody>
-      </p:sp>
-      <p:cxnSp>
-        <p:nvCxnSpPr>
-          <p:cNvPr id="58" name="Elbow Connector 16">
-            <a:extLst>
-              <a:ext uri="{FF2B5EF4-FFF2-40B4-BE49-F238E27FC236}">
-                <a16:creationId xmlns:a16="http://schemas.microsoft.com/office/drawing/2014/main" id="{85EF203B-FB21-D975-EE8B-8545B77EEEC3}"/>
-              </a:ext>
-            </a:extLst>
-          </p:cNvPr>
-          <p:cNvCxnSpPr>
-            <a:cxnSpLocks/>
-            <a:stCxn id="56" idx="2"/>
-            <a:endCxn id="36" idx="0"/>
-          </p:cNvCxnSpPr>
-          <p:nvPr/>
-        </p:nvCxnSpPr>
-        <p:spPr bwMode="auto">
-          <a:xfrm>
-            <a:off x="1590576" y="2319754"/>
-            <a:ext cx="0" cy="472056"/>
-          </a:xfrm>
-          <a:prstGeom prst="straightConnector1">
-            <a:avLst/>
-          </a:prstGeom>
-          <a:noFill/>
-          <a:ln w="9525" cap="flat" cmpd="sng" algn="ctr">
-            <a:solidFill>
-              <a:schemeClr val="tx1"/>
-            </a:solidFill>
-            <a:prstDash val="solid"/>
-            <a:round/>
-            <a:headEnd type="none" w="med" len="med"/>
-            <a:tailEnd type="triangle"/>
-          </a:ln>
-          <a:effectLst/>
-        </p:spPr>
-      </p:cxnSp>
-      <p:cxnSp>
-        <p:nvCxnSpPr>
-          <p:cNvPr id="59" name="Elbow Connector 16">
-            <a:extLst>
-              <a:ext uri="{FF2B5EF4-FFF2-40B4-BE49-F238E27FC236}">
-                <a16:creationId xmlns:a16="http://schemas.microsoft.com/office/drawing/2014/main" id="{51137EF7-4A1A-A985-89D6-0DDCCB37A22A}"/>
-              </a:ext>
-            </a:extLst>
-          </p:cNvPr>
-          <p:cNvCxnSpPr>
-            <a:cxnSpLocks/>
-            <a:stCxn id="60" idx="2"/>
-            <a:endCxn id="34" idx="0"/>
-          </p:cNvCxnSpPr>
-          <p:nvPr/>
-        </p:nvCxnSpPr>
-        <p:spPr bwMode="auto">
-          <a:xfrm>
-            <a:off x="6126480" y="2319754"/>
-            <a:ext cx="0" cy="241802"/>
-          </a:xfrm>
-          <a:prstGeom prst="straightConnector1">
-            <a:avLst/>
-          </a:prstGeom>
-          <a:noFill/>
-          <a:ln w="9525" cap="flat" cmpd="sng" algn="ctr">
-            <a:solidFill>
-              <a:schemeClr val="tx1"/>
-            </a:solidFill>
-            <a:prstDash val="solid"/>
-            <a:round/>
-            <a:headEnd type="none" w="med" len="med"/>
-            <a:tailEnd type="triangle"/>
-          </a:ln>
-          <a:effectLst/>
-        </p:spPr>
-      </p:cxnSp>
-      <p:sp>
-        <p:nvSpPr>
-          <p:cNvPr id="60" name="TextBox 59">
-            <a:extLst>
-              <a:ext uri="{FF2B5EF4-FFF2-40B4-BE49-F238E27FC236}">
-                <a16:creationId xmlns:a16="http://schemas.microsoft.com/office/drawing/2014/main" id="{D61ABAAD-0AAD-DD24-971D-21D1CBFAB8F6}"/>
-              </a:ext>
-            </a:extLst>
-          </p:cNvPr>
-          <p:cNvSpPr txBox="1"/>
-          <p:nvPr/>
-        </p:nvSpPr>
-        <p:spPr>
-          <a:xfrm>
-            <a:off x="5257800" y="1981200"/>
-            <a:ext cx="1737360" cy="338554"/>
-          </a:xfrm>
-          <a:prstGeom prst="rect">
-            <a:avLst/>
-          </a:prstGeom>
-          <a:noFill/>
-          <a:ln>
-            <a:solidFill>
-              <a:schemeClr val="tx1"/>
-            </a:solidFill>
-          </a:ln>
-        </p:spPr>
-        <p:txBody>
-          <a:bodyPr wrap="none" rtlCol="0">
-            <a:spAutoFit/>
-          </a:bodyPr>
-          <a:lstStyle>
-            <a:defPPr>
-              <a:defRPr lang="en-US"/>
-            </a:defPPr>
-          </a:lstStyle>
-          <a:p>
-            <a:pPr algn="ctr"/>
-            <a:r>
-              <a:rPr lang="en-US" sz="1600" dirty="0" err="1"/>
-              <a:t>SubprogramDecls</a:t>
-            </a:r>
-            <a:endParaRPr lang="en-US" sz="1600" dirty="0"/>
-          </a:p>
-        </p:txBody>
-      </p:sp>
-      <p:cxnSp>
-        <p:nvCxnSpPr>
-          <p:cNvPr id="63" name="Elbow Connector 16">
-            <a:extLst>
-              <a:ext uri="{FF2B5EF4-FFF2-40B4-BE49-F238E27FC236}">
-                <a16:creationId xmlns:a16="http://schemas.microsoft.com/office/drawing/2014/main" id="{3BCC0B0E-3692-9DE2-E7A5-140798E4726F}"/>
-              </a:ext>
-            </a:extLst>
-          </p:cNvPr>
-          <p:cNvCxnSpPr>
-            <a:cxnSpLocks/>
-            <a:stCxn id="34" idx="2"/>
-            <a:endCxn id="57" idx="0"/>
-          </p:cNvCxnSpPr>
-          <p:nvPr/>
-        </p:nvCxnSpPr>
-        <p:spPr bwMode="auto">
-          <a:xfrm rot="16200000" flipH="1">
-            <a:off x="6005580" y="3267230"/>
-            <a:ext cx="241801" cy="1"/>
-          </a:xfrm>
-          <a:prstGeom prst="bentConnector3">
-            <a:avLst>
-              <a:gd name="adj1" fmla="val 50000"/>
-            </a:avLst>
-          </a:prstGeom>
-          <a:noFill/>
-          <a:ln w="9525" cap="flat" cmpd="sng" algn="ctr">
-            <a:solidFill>
-              <a:schemeClr val="tx1"/>
-            </a:solidFill>
-            <a:prstDash val="solid"/>
-            <a:round/>
-            <a:headEnd type="none" w="med" len="med"/>
-            <a:tailEnd type="triangle"/>
-          </a:ln>
-          <a:effectLst/>
-        </p:spPr>
-      </p:cxnSp>
-      <p:sp>
-        <p:nvSpPr>
-          <p:cNvPr id="36" name="TextBox 35">
-            <a:extLst>
-              <a:ext uri="{FF2B5EF4-FFF2-40B4-BE49-F238E27FC236}">
-                <a16:creationId xmlns:a16="http://schemas.microsoft.com/office/drawing/2014/main" id="{282320C6-00EC-EE77-3632-8582B2DD2B83}"/>
-              </a:ext>
-            </a:extLst>
-          </p:cNvPr>
-          <p:cNvSpPr txBox="1"/>
-          <p:nvPr/>
-        </p:nvSpPr>
-        <p:spPr>
-          <a:xfrm>
-            <a:off x="1141991" y="2791810"/>
-            <a:ext cx="897170" cy="338554"/>
-          </a:xfrm>
-          <a:prstGeom prst="rect">
-            <a:avLst/>
-          </a:prstGeom>
-          <a:noFill/>
-          <a:ln>
-            <a:solidFill>
-              <a:schemeClr val="tx1"/>
-            </a:solidFill>
-          </a:ln>
-        </p:spPr>
-        <p:txBody>
-          <a:bodyPr wrap="none" rtlCol="0">
-            <a:spAutoFit/>
-          </a:bodyPr>
-          <a:lstStyle>
-            <a:defPPr>
-              <a:defRPr lang="en-US"/>
-            </a:defPPr>
-          </a:lstStyle>
-          <a:p>
-            <a:pPr algn="ctr"/>
-            <a:r>
-              <a:rPr lang="en-US" sz="1600" dirty="0"/>
-              <a:t>VarDecl</a:t>
-            </a:r>
-          </a:p>
-        </p:txBody>
-      </p:sp>
-      <p:cxnSp>
-        <p:nvCxnSpPr>
-          <p:cNvPr id="5" name="Straight Arrow Connector 4">
-            <a:extLst>
-              <a:ext uri="{FF2B5EF4-FFF2-40B4-BE49-F238E27FC236}">
-                <a16:creationId xmlns:a16="http://schemas.microsoft.com/office/drawing/2014/main" id="{29AD9E0F-A348-CB6F-4EC4-8000B1CCA434}"/>
-              </a:ext>
-            </a:extLst>
-          </p:cNvPr>
-          <p:cNvCxnSpPr>
-            <a:stCxn id="36" idx="2"/>
-            <a:endCxn id="35" idx="0"/>
-          </p:cNvCxnSpPr>
-          <p:nvPr/>
-        </p:nvCxnSpPr>
-        <p:spPr bwMode="auto">
-          <a:xfrm>
-            <a:off x="1590576" y="3130364"/>
-            <a:ext cx="0" cy="472056"/>
-          </a:xfrm>
-          <a:prstGeom prst="straightConnector1">
-            <a:avLst/>
-          </a:prstGeom>
-          <a:noFill/>
-          <a:ln w="9525" cap="flat" cmpd="sng" algn="ctr">
-            <a:solidFill>
-              <a:schemeClr val="tx1"/>
-            </a:solidFill>
-            <a:prstDash val="solid"/>
-            <a:round/>
-            <a:headEnd type="none" w="med" len="med"/>
-            <a:tailEnd type="triangle"/>
-          </a:ln>
-          <a:effectLst/>
-        </p:spPr>
-      </p:cxnSp>
+          <p:cNvSpPr>
+            <a:spLocks noGrp="1"/>
+          </p:cNvSpPr>
+          <p:nvPr>
+            <p:ph type="sldNum" sz="quarter" idx="11"/>
+          </p:nvPr>
+        </p:nvSpPr>
+        <p:spPr/>
+        <p:txBody>
+          <a:bodyPr/>
+          <a:lstStyle/>
+          <a:p>
+            <a:pPr>
+              <a:defRPr/>
+            </a:pPr>
+            <a:r>
+              <a:rPr lang="en-US"/>
+              <a:t>Slide </a:t>
+            </a:r>
+            <a:fld id="{0493F5BC-5863-40DB-9BF6-90302664BBE6}" type="slidenum">
+              <a:rPr lang="en-US" smtClean="0"/>
+              <a:pPr>
+                <a:defRPr/>
+              </a:pPr>
+              <a:t>54</a:t>
+            </a:fld>
+            <a:endParaRPr lang="en-US" dirty="0"/>
+          </a:p>
+        </p:txBody>
+      </p:sp>
     </p:spTree>
     <p:extLst>
       <p:ext uri="{BB962C8B-B14F-4D97-AF65-F5344CB8AC3E}">
-        <p14:creationId xmlns:p14="http://schemas.microsoft.com/office/powerpoint/2010/main" val="758574541"/>
+        <p14:creationId xmlns:p14="http://schemas.microsoft.com/office/powerpoint/2010/main" val="2400291406"/>
       </p:ext>
     </p:extLst>
   </p:cSld>

</xml_diff>